<commit_message>
Fixed typos in the presentation
</commit_message>
<xml_diff>
--- a/Yelp_capstone_project.pptx
+++ b/Yelp_capstone_project.pptx
@@ -233,7 +233,7 @@
           <a:p>
             <a:fld id="{5843BA56-6318-400F-9D8F-8CB786C6E0E6}" type="datetimeFigureOut">
               <a:rPr lang="en-GB" smtClean="0"/>
-              <a:t>27/05/2016</a:t>
+              <a:t>17/06/2016</a:t>
             </a:fld>
             <a:endParaRPr lang="en-GB"/>
           </a:p>
@@ -297,35 +297,35 @@
           <a:p>
             <a:pPr lvl="0"/>
             <a:r>
-              <a:rPr lang="en-US" smtClean="0"/>
+              <a:rPr lang="en-US"/>
               <a:t>Click to edit Master text styles</a:t>
             </a:r>
           </a:p>
           <a:p>
             <a:pPr lvl="1"/>
             <a:r>
-              <a:rPr lang="en-US" smtClean="0"/>
+              <a:rPr lang="en-US"/>
               <a:t>Second level</a:t>
             </a:r>
           </a:p>
           <a:p>
             <a:pPr lvl="2"/>
             <a:r>
-              <a:rPr lang="en-US" smtClean="0"/>
+              <a:rPr lang="en-US"/>
               <a:t>Third level</a:t>
             </a:r>
           </a:p>
           <a:p>
             <a:pPr lvl="3"/>
             <a:r>
-              <a:rPr lang="en-US" smtClean="0"/>
+              <a:rPr lang="en-US"/>
               <a:t>Fourth level</a:t>
             </a:r>
           </a:p>
           <a:p>
             <a:pPr lvl="4"/>
             <a:r>
-              <a:rPr lang="en-US" smtClean="0"/>
+              <a:rPr lang="en-US"/>
               <a:t>Fifth level</a:t>
             </a:r>
             <a:endParaRPr lang="en-GB"/>
@@ -672,7 +672,7 @@
           </a:lstStyle>
           <a:p>
             <a:r>
-              <a:rPr lang="en-US" smtClean="0"/>
+              <a:rPr lang="en-US"/>
               <a:t>Click to edit Master title style</a:t>
             </a:r>
             <a:endParaRPr lang="en-US" dirty="0"/>
@@ -791,7 +791,7 @@
           </a:lstStyle>
           <a:p>
             <a:r>
-              <a:rPr lang="en-US" smtClean="0"/>
+              <a:rPr lang="en-US"/>
               <a:t>Click to edit Master subtitle style</a:t>
             </a:r>
             <a:endParaRPr lang="en-US" dirty="0"/>
@@ -816,7 +816,7 @@
             <a:fld id="{1D8BD707-D9CF-40AE-B4C6-C98DA3205C09}" type="datetimeFigureOut">
               <a:rPr lang="en-US" smtClean="0"/>
               <a:pPr/>
-              <a:t>5/27/2016</a:t>
+              <a:t>6/17/2016</a:t>
             </a:fld>
             <a:endParaRPr lang="en-US"/>
           </a:p>
@@ -949,7 +949,7 @@
           <a:lstStyle/>
           <a:p>
             <a:r>
-              <a:rPr lang="en-US" smtClean="0"/>
+              <a:rPr lang="en-US"/>
               <a:t>Click to edit Master title style</a:t>
             </a:r>
             <a:endParaRPr lang="en-US" dirty="0"/>
@@ -978,38 +978,37 @@
           <a:p>
             <a:pPr lvl="0"/>
             <a:r>
-              <a:rPr lang="en-US" smtClean="0"/>
+              <a:rPr lang="en-US"/>
               <a:t>Click to edit Master text styles</a:t>
             </a:r>
           </a:p>
           <a:p>
             <a:pPr lvl="1"/>
             <a:r>
-              <a:rPr lang="en-US" smtClean="0"/>
+              <a:rPr lang="en-US"/>
               <a:t>Second level</a:t>
             </a:r>
           </a:p>
           <a:p>
             <a:pPr lvl="2"/>
             <a:r>
-              <a:rPr lang="en-US" smtClean="0"/>
+              <a:rPr lang="en-US"/>
               <a:t>Third level</a:t>
             </a:r>
           </a:p>
           <a:p>
             <a:pPr lvl="3"/>
             <a:r>
-              <a:rPr lang="en-US" smtClean="0"/>
+              <a:rPr lang="en-US"/>
               <a:t>Fourth level</a:t>
             </a:r>
           </a:p>
           <a:p>
             <a:pPr lvl="4"/>
             <a:r>
-              <a:rPr lang="en-US" smtClean="0"/>
+              <a:rPr lang="en-US"/>
               <a:t>Fifth level</a:t>
             </a:r>
-            <a:endParaRPr lang="en-US"/>
           </a:p>
         </p:txBody>
       </p:sp>
@@ -1031,7 +1030,7 @@
             <a:fld id="{1D8BD707-D9CF-40AE-B4C6-C98DA3205C09}" type="datetimeFigureOut">
               <a:rPr lang="en-US" smtClean="0"/>
               <a:pPr/>
-              <a:t>5/27/2016</a:t>
+              <a:t>6/17/2016</a:t>
             </a:fld>
             <a:endParaRPr lang="en-US"/>
           </a:p>
@@ -1126,7 +1125,7 @@
           <a:lstStyle/>
           <a:p>
             <a:r>
-              <a:rPr lang="en-US" smtClean="0"/>
+              <a:rPr lang="en-US"/>
               <a:t>Click to edit Master title style</a:t>
             </a:r>
             <a:endParaRPr lang="en-US" dirty="0"/>
@@ -1155,38 +1154,37 @@
           <a:p>
             <a:pPr lvl="0"/>
             <a:r>
-              <a:rPr lang="en-US" smtClean="0"/>
+              <a:rPr lang="en-US"/>
               <a:t>Click to edit Master text styles</a:t>
             </a:r>
           </a:p>
           <a:p>
             <a:pPr lvl="1"/>
             <a:r>
-              <a:rPr lang="en-US" smtClean="0"/>
+              <a:rPr lang="en-US"/>
               <a:t>Second level</a:t>
             </a:r>
           </a:p>
           <a:p>
             <a:pPr lvl="2"/>
             <a:r>
-              <a:rPr lang="en-US" smtClean="0"/>
+              <a:rPr lang="en-US"/>
               <a:t>Third level</a:t>
             </a:r>
           </a:p>
           <a:p>
             <a:pPr lvl="3"/>
             <a:r>
-              <a:rPr lang="en-US" smtClean="0"/>
+              <a:rPr lang="en-US"/>
               <a:t>Fourth level</a:t>
             </a:r>
           </a:p>
           <a:p>
             <a:pPr lvl="4"/>
             <a:r>
-              <a:rPr lang="en-US" smtClean="0"/>
+              <a:rPr lang="en-US"/>
               <a:t>Fifth level</a:t>
             </a:r>
-            <a:endParaRPr lang="en-US"/>
           </a:p>
         </p:txBody>
       </p:sp>
@@ -1208,7 +1206,7 @@
             <a:fld id="{1D8BD707-D9CF-40AE-B4C6-C98DA3205C09}" type="datetimeFigureOut">
               <a:rPr lang="en-US" smtClean="0"/>
               <a:pPr/>
-              <a:t>5/27/2016</a:t>
+              <a:t>6/17/2016</a:t>
             </a:fld>
             <a:endParaRPr lang="en-US"/>
           </a:p>
@@ -1298,10 +1296,9 @@
           <a:lstStyle/>
           <a:p>
             <a:r>
-              <a:rPr lang="en-US" smtClean="0"/>
+              <a:rPr lang="en-US"/>
               <a:t>Click to edit Master title style</a:t>
             </a:r>
-            <a:endParaRPr lang="en-US"/>
           </a:p>
         </p:txBody>
       </p:sp>
@@ -1322,38 +1319,37 @@
           <a:p>
             <a:pPr lvl="0"/>
             <a:r>
-              <a:rPr lang="en-US" smtClean="0"/>
+              <a:rPr lang="en-US"/>
               <a:t>Click to edit Master text styles</a:t>
             </a:r>
           </a:p>
           <a:p>
             <a:pPr lvl="1"/>
             <a:r>
-              <a:rPr lang="en-US" smtClean="0"/>
+              <a:rPr lang="en-US"/>
               <a:t>Second level</a:t>
             </a:r>
           </a:p>
           <a:p>
             <a:pPr lvl="2"/>
             <a:r>
-              <a:rPr lang="en-US" smtClean="0"/>
+              <a:rPr lang="en-US"/>
               <a:t>Third level</a:t>
             </a:r>
           </a:p>
           <a:p>
             <a:pPr lvl="3"/>
             <a:r>
-              <a:rPr lang="en-US" smtClean="0"/>
+              <a:rPr lang="en-US"/>
               <a:t>Fourth level</a:t>
             </a:r>
           </a:p>
           <a:p>
             <a:pPr lvl="4"/>
             <a:r>
-              <a:rPr lang="en-US" smtClean="0"/>
+              <a:rPr lang="en-US"/>
               <a:t>Fifth level</a:t>
             </a:r>
-            <a:endParaRPr lang="en-US"/>
           </a:p>
         </p:txBody>
       </p:sp>
@@ -1375,7 +1371,7 @@
             <a:fld id="{1D8BD707-D9CF-40AE-B4C6-C98DA3205C09}" type="datetimeFigureOut">
               <a:rPr lang="en-US" smtClean="0"/>
               <a:pPr/>
-              <a:t>5/27/2016</a:t>
+              <a:t>6/17/2016</a:t>
             </a:fld>
             <a:endParaRPr lang="en-US"/>
           </a:p>
@@ -1517,7 +1513,7 @@
           </a:lstStyle>
           <a:p>
             <a:r>
-              <a:rPr lang="en-US" smtClean="0"/>
+              <a:rPr lang="en-US"/>
               <a:t>Click to edit Master title style</a:t>
             </a:r>
             <a:endParaRPr lang="en-US" dirty="0"/>
@@ -1637,7 +1633,7 @@
           <a:p>
             <a:pPr lvl="0"/>
             <a:r>
-              <a:rPr lang="en-US" smtClean="0"/>
+              <a:rPr lang="en-US"/>
               <a:t>Click to edit Master text styles</a:t>
             </a:r>
           </a:p>
@@ -1661,7 +1657,7 @@
             <a:fld id="{1D8BD707-D9CF-40AE-B4C6-C98DA3205C09}" type="datetimeFigureOut">
               <a:rPr lang="en-US" smtClean="0"/>
               <a:pPr/>
-              <a:t>5/27/2016</a:t>
+              <a:t>6/17/2016</a:t>
             </a:fld>
             <a:endParaRPr lang="en-US"/>
           </a:p>
@@ -1794,10 +1790,9 @@
           <a:lstStyle/>
           <a:p>
             <a:r>
-              <a:rPr lang="en-US" smtClean="0"/>
+              <a:rPr lang="en-US"/>
               <a:t>Click to edit Master title style</a:t>
             </a:r>
-            <a:endParaRPr lang="en-US"/>
           </a:p>
         </p:txBody>
       </p:sp>
@@ -1851,35 +1846,35 @@
           <a:p>
             <a:pPr lvl="0"/>
             <a:r>
-              <a:rPr lang="en-US" smtClean="0"/>
+              <a:rPr lang="en-US"/>
               <a:t>Click to edit Master text styles</a:t>
             </a:r>
           </a:p>
           <a:p>
             <a:pPr lvl="1"/>
             <a:r>
-              <a:rPr lang="en-US" smtClean="0"/>
+              <a:rPr lang="en-US"/>
               <a:t>Second level</a:t>
             </a:r>
           </a:p>
           <a:p>
             <a:pPr lvl="2"/>
             <a:r>
-              <a:rPr lang="en-US" smtClean="0"/>
+              <a:rPr lang="en-US"/>
               <a:t>Third level</a:t>
             </a:r>
           </a:p>
           <a:p>
             <a:pPr lvl="3"/>
             <a:r>
-              <a:rPr lang="en-US" smtClean="0"/>
+              <a:rPr lang="en-US"/>
               <a:t>Fourth level</a:t>
             </a:r>
           </a:p>
           <a:p>
             <a:pPr lvl="4"/>
             <a:r>
-              <a:rPr lang="en-US" smtClean="0"/>
+              <a:rPr lang="en-US"/>
               <a:t>Fifth level</a:t>
             </a:r>
             <a:endParaRPr lang="en-US" dirty="0"/>
@@ -1936,38 +1931,37 @@
           <a:p>
             <a:pPr lvl="0"/>
             <a:r>
-              <a:rPr lang="en-US" smtClean="0"/>
+              <a:rPr lang="en-US"/>
               <a:t>Click to edit Master text styles</a:t>
             </a:r>
           </a:p>
           <a:p>
             <a:pPr lvl="1"/>
             <a:r>
-              <a:rPr lang="en-US" smtClean="0"/>
+              <a:rPr lang="en-US"/>
               <a:t>Second level</a:t>
             </a:r>
           </a:p>
           <a:p>
             <a:pPr lvl="2"/>
             <a:r>
-              <a:rPr lang="en-US" smtClean="0"/>
+              <a:rPr lang="en-US"/>
               <a:t>Third level</a:t>
             </a:r>
           </a:p>
           <a:p>
             <a:pPr lvl="3"/>
             <a:r>
-              <a:rPr lang="en-US" smtClean="0"/>
+              <a:rPr lang="en-US"/>
               <a:t>Fourth level</a:t>
             </a:r>
           </a:p>
           <a:p>
             <a:pPr lvl="4"/>
             <a:r>
-              <a:rPr lang="en-US" smtClean="0"/>
+              <a:rPr lang="en-US"/>
               <a:t>Fifth level</a:t>
             </a:r>
-            <a:endParaRPr lang="en-US"/>
           </a:p>
         </p:txBody>
       </p:sp>
@@ -1989,7 +1983,7 @@
             <a:fld id="{1D8BD707-D9CF-40AE-B4C6-C98DA3205C09}" type="datetimeFigureOut">
               <a:rPr lang="en-US" smtClean="0"/>
               <a:pPr/>
-              <a:t>5/27/2016</a:t>
+              <a:t>6/17/2016</a:t>
             </a:fld>
             <a:endParaRPr lang="en-US"/>
           </a:p>
@@ -2083,7 +2077,7 @@
           </a:lstStyle>
           <a:p>
             <a:r>
-              <a:rPr lang="en-US" smtClean="0"/>
+              <a:rPr lang="en-US"/>
               <a:t>Click to edit Master title style</a:t>
             </a:r>
             <a:endParaRPr lang="en-US" dirty="0"/>
@@ -2153,7 +2147,7 @@
           <a:p>
             <a:pPr lvl="0"/>
             <a:r>
-              <a:rPr lang="en-US" smtClean="0"/>
+              <a:rPr lang="en-US"/>
               <a:t>Click to edit Master text styles</a:t>
             </a:r>
           </a:p>
@@ -2209,35 +2203,35 @@
           <a:p>
             <a:pPr lvl="0"/>
             <a:r>
-              <a:rPr lang="en-US" smtClean="0"/>
+              <a:rPr lang="en-US"/>
               <a:t>Click to edit Master text styles</a:t>
             </a:r>
           </a:p>
           <a:p>
             <a:pPr lvl="1"/>
             <a:r>
-              <a:rPr lang="en-US" smtClean="0"/>
+              <a:rPr lang="en-US"/>
               <a:t>Second level</a:t>
             </a:r>
           </a:p>
           <a:p>
             <a:pPr lvl="2"/>
             <a:r>
-              <a:rPr lang="en-US" smtClean="0"/>
+              <a:rPr lang="en-US"/>
               <a:t>Third level</a:t>
             </a:r>
           </a:p>
           <a:p>
             <a:pPr lvl="3"/>
             <a:r>
-              <a:rPr lang="en-US" smtClean="0"/>
+              <a:rPr lang="en-US"/>
               <a:t>Fourth level</a:t>
             </a:r>
           </a:p>
           <a:p>
             <a:pPr lvl="4"/>
             <a:r>
-              <a:rPr lang="en-US" smtClean="0"/>
+              <a:rPr lang="en-US"/>
               <a:t>Fifth level</a:t>
             </a:r>
             <a:endParaRPr lang="en-US" dirty="0"/>
@@ -2307,7 +2301,7 @@
           <a:p>
             <a:pPr lvl="0"/>
             <a:r>
-              <a:rPr lang="en-US" smtClean="0"/>
+              <a:rPr lang="en-US"/>
               <a:t>Click to edit Master text styles</a:t>
             </a:r>
           </a:p>
@@ -2363,38 +2357,37 @@
           <a:p>
             <a:pPr lvl="0"/>
             <a:r>
-              <a:rPr lang="en-US" smtClean="0"/>
+              <a:rPr lang="en-US"/>
               <a:t>Click to edit Master text styles</a:t>
             </a:r>
           </a:p>
           <a:p>
             <a:pPr lvl="1"/>
             <a:r>
-              <a:rPr lang="en-US" smtClean="0"/>
+              <a:rPr lang="en-US"/>
               <a:t>Second level</a:t>
             </a:r>
           </a:p>
           <a:p>
             <a:pPr lvl="2"/>
             <a:r>
-              <a:rPr lang="en-US" smtClean="0"/>
+              <a:rPr lang="en-US"/>
               <a:t>Third level</a:t>
             </a:r>
           </a:p>
           <a:p>
             <a:pPr lvl="3"/>
             <a:r>
-              <a:rPr lang="en-US" smtClean="0"/>
+              <a:rPr lang="en-US"/>
               <a:t>Fourth level</a:t>
             </a:r>
           </a:p>
           <a:p>
             <a:pPr lvl="4"/>
             <a:r>
-              <a:rPr lang="en-US" smtClean="0"/>
+              <a:rPr lang="en-US"/>
               <a:t>Fifth level</a:t>
             </a:r>
-            <a:endParaRPr lang="en-US"/>
           </a:p>
         </p:txBody>
       </p:sp>
@@ -2416,7 +2409,7 @@
             <a:fld id="{1D8BD707-D9CF-40AE-B4C6-C98DA3205C09}" type="datetimeFigureOut">
               <a:rPr lang="en-US" smtClean="0"/>
               <a:pPr/>
-              <a:t>5/27/2016</a:t>
+              <a:t>6/17/2016</a:t>
             </a:fld>
             <a:endParaRPr lang="en-US"/>
           </a:p>
@@ -2566,7 +2559,7 @@
           <a:lstStyle/>
           <a:p>
             <a:r>
-              <a:rPr lang="en-US" smtClean="0"/>
+              <a:rPr lang="en-US"/>
               <a:t>Click to edit Master title style</a:t>
             </a:r>
             <a:endParaRPr lang="en-US" dirty="0"/>
@@ -2591,7 +2584,7 @@
             <a:fld id="{1D8BD707-D9CF-40AE-B4C6-C98DA3205C09}" type="datetimeFigureOut">
               <a:rPr lang="en-US" smtClean="0"/>
               <a:pPr/>
-              <a:t>5/27/2016</a:t>
+              <a:t>6/17/2016</a:t>
             </a:fld>
             <a:endParaRPr lang="en-US"/>
           </a:p>
@@ -2683,7 +2676,7 @@
             <a:fld id="{1D8BD707-D9CF-40AE-B4C6-C98DA3205C09}" type="datetimeFigureOut">
               <a:rPr lang="en-US" smtClean="0"/>
               <a:pPr/>
-              <a:t>5/27/2016</a:t>
+              <a:t>6/17/2016</a:t>
             </a:fld>
             <a:endParaRPr lang="en-US"/>
           </a:p>
@@ -2784,10 +2777,9 @@
           </a:lstStyle>
           <a:p>
             <a:r>
-              <a:rPr lang="en-US" smtClean="0"/>
+              <a:rPr lang="en-US"/>
               <a:t>Click to edit Master title style</a:t>
             </a:r>
-            <a:endParaRPr lang="en-US"/>
           </a:p>
         </p:txBody>
       </p:sp>
@@ -2841,35 +2833,35 @@
           <a:p>
             <a:pPr lvl="0"/>
             <a:r>
-              <a:rPr lang="en-US" smtClean="0"/>
+              <a:rPr lang="en-US"/>
               <a:t>Click to edit Master text styles</a:t>
             </a:r>
           </a:p>
           <a:p>
             <a:pPr lvl="1"/>
             <a:r>
-              <a:rPr lang="en-US" smtClean="0"/>
+              <a:rPr lang="en-US"/>
               <a:t>Second level</a:t>
             </a:r>
           </a:p>
           <a:p>
             <a:pPr lvl="2"/>
             <a:r>
-              <a:rPr lang="en-US" smtClean="0"/>
+              <a:rPr lang="en-US"/>
               <a:t>Third level</a:t>
             </a:r>
           </a:p>
           <a:p>
             <a:pPr lvl="3"/>
             <a:r>
-              <a:rPr lang="en-US" smtClean="0"/>
+              <a:rPr lang="en-US"/>
               <a:t>Fourth level</a:t>
             </a:r>
           </a:p>
           <a:p>
             <a:pPr lvl="4"/>
             <a:r>
-              <a:rPr lang="en-US" smtClean="0"/>
+              <a:rPr lang="en-US"/>
               <a:t>Fifth level</a:t>
             </a:r>
             <a:endParaRPr lang="en-US" dirty="0"/>
@@ -2941,7 +2933,7 @@
           <a:p>
             <a:pPr lvl="0"/>
             <a:r>
-              <a:rPr lang="en-US" smtClean="0"/>
+              <a:rPr lang="en-US"/>
               <a:t>Click to edit Master text styles</a:t>
             </a:r>
           </a:p>
@@ -2965,7 +2957,7 @@
             <a:fld id="{1D8BD707-D9CF-40AE-B4C6-C98DA3205C09}" type="datetimeFigureOut">
               <a:rPr lang="en-US" smtClean="0"/>
               <a:pPr/>
-              <a:t>5/27/2016</a:t>
+              <a:t>6/17/2016</a:t>
             </a:fld>
             <a:endParaRPr lang="en-US"/>
           </a:p>
@@ -3104,7 +3096,7 @@
           </a:lstStyle>
           <a:p>
             <a:r>
-              <a:rPr lang="en-US" smtClean="0"/>
+              <a:rPr lang="en-US"/>
               <a:t>Click to edit Master title style</a:t>
             </a:r>
             <a:endParaRPr lang="en-US" dirty="0"/>
@@ -3174,10 +3166,9 @@
           </a:lstStyle>
           <a:p>
             <a:r>
-              <a:rPr lang="en-US" smtClean="0"/>
+              <a:rPr lang="en-US"/>
               <a:t>Click icon to add picture</a:t>
             </a:r>
-            <a:endParaRPr lang="en-US"/>
           </a:p>
         </p:txBody>
       </p:sp>
@@ -3242,7 +3233,7 @@
           <a:p>
             <a:pPr lvl="0"/>
             <a:r>
-              <a:rPr lang="en-US" smtClean="0"/>
+              <a:rPr lang="en-US"/>
               <a:t>Click to edit Master text styles</a:t>
             </a:r>
           </a:p>
@@ -3266,7 +3257,7 @@
             <a:fld id="{1D8BD707-D9CF-40AE-B4C6-C98DA3205C09}" type="datetimeFigureOut">
               <a:rPr lang="en-US" smtClean="0"/>
               <a:pPr/>
-              <a:t>5/27/2016</a:t>
+              <a:t>6/17/2016</a:t>
             </a:fld>
             <a:endParaRPr lang="en-US"/>
           </a:p>
@@ -3371,7 +3362,7 @@
           <a:lstStyle/>
           <a:p>
             <a:r>
-              <a:rPr lang="en-US" smtClean="0"/>
+              <a:rPr lang="en-US"/>
               <a:t>Click to edit Master title style</a:t>
             </a:r>
             <a:endParaRPr lang="en-US" dirty="0"/>
@@ -3405,35 +3396,35 @@
           <a:p>
             <a:pPr lvl="0"/>
             <a:r>
-              <a:rPr lang="en-US" smtClean="0"/>
+              <a:rPr lang="en-US"/>
               <a:t>Click to edit Master text styles</a:t>
             </a:r>
           </a:p>
           <a:p>
             <a:pPr lvl="1"/>
             <a:r>
-              <a:rPr lang="en-US" smtClean="0"/>
+              <a:rPr lang="en-US"/>
               <a:t>Second level</a:t>
             </a:r>
           </a:p>
           <a:p>
             <a:pPr lvl="2"/>
             <a:r>
-              <a:rPr lang="en-US" smtClean="0"/>
+              <a:rPr lang="en-US"/>
               <a:t>Third level</a:t>
             </a:r>
           </a:p>
           <a:p>
             <a:pPr lvl="3"/>
             <a:r>
-              <a:rPr lang="en-US" smtClean="0"/>
+              <a:rPr lang="en-US"/>
               <a:t>Fourth level</a:t>
             </a:r>
           </a:p>
           <a:p>
             <a:pPr lvl="4"/>
             <a:r>
-              <a:rPr lang="en-US" smtClean="0"/>
+              <a:rPr lang="en-US"/>
               <a:t>Fifth level</a:t>
             </a:r>
             <a:endParaRPr lang="en-US" dirty="0"/>
@@ -3478,7 +3469,7 @@
             <a:fld id="{1D8BD707-D9CF-40AE-B4C6-C98DA3205C09}" type="datetimeFigureOut">
               <a:rPr lang="en-US" smtClean="0"/>
               <a:pPr/>
-              <a:t>5/27/2016</a:t>
+              <a:t>6/17/2016</a:t>
             </a:fld>
             <a:endParaRPr lang="en-US"/>
           </a:p>
@@ -4045,15 +4036,7 @@
                   <a:schemeClr val="tx1"/>
                 </a:solidFill>
               </a:rPr>
-              <a:t>Yelp Restaurant Photo </a:t>
-            </a:r>
-            <a:r>
-              <a:rPr lang="en-GB" sz="4800" dirty="0" smtClean="0">
-                <a:solidFill>
-                  <a:schemeClr val="tx1"/>
-                </a:solidFill>
-              </a:rPr>
-              <a:t>Classification</a:t>
+              <a:t>Yelp Restaurant Photo Classification</a:t>
             </a:r>
             <a:endParaRPr lang="en-GB" sz="11500" dirty="0">
               <a:solidFill>
@@ -4086,45 +4069,35 @@
           <a:lstStyle/>
           <a:p>
             <a:r>
-              <a:rPr lang="en-GB" dirty="0" smtClean="0"/>
+              <a:rPr lang="en-GB" dirty="0"/>
               <a:t>Anna </a:t>
             </a:r>
             <a:r>
-              <a:rPr lang="en-GB" dirty="0" err="1" smtClean="0"/>
+              <a:rPr lang="en-GB" dirty="0" err="1"/>
               <a:t>Rumyantseva</a:t>
             </a:r>
             <a:r>
-              <a:rPr lang="en-GB" dirty="0" smtClean="0"/>
+              <a:rPr lang="en-GB" dirty="0"/>
               <a:t> </a:t>
             </a:r>
-            <a:endParaRPr lang="en-GB" dirty="0" smtClean="0"/>
-          </a:p>
-          <a:p>
-            <a:r>
-              <a:rPr lang="en-GB" dirty="0" smtClean="0"/>
-              <a:t>Springboard </a:t>
-            </a:r>
-            <a:r>
-              <a:rPr lang="en-GB" dirty="0" smtClean="0"/>
-              <a:t>Data Science Intensive Workshop</a:t>
-            </a:r>
-          </a:p>
-          <a:p>
-            <a:r>
-              <a:rPr lang="en-GB" dirty="0" smtClean="0"/>
-              <a:t>Spring </a:t>
-            </a:r>
-            <a:r>
-              <a:rPr lang="en-GB" dirty="0" smtClean="0"/>
-              <a:t>2016</a:t>
-            </a:r>
-          </a:p>
-          <a:p>
-            <a:r>
-              <a:rPr lang="en-GB" dirty="0" smtClean="0"/>
+          </a:p>
+          <a:p>
+            <a:r>
+              <a:rPr lang="en-GB" dirty="0"/>
+              <a:t>Springboard Data Science Intensive Workshop</a:t>
+            </a:r>
+          </a:p>
+          <a:p>
+            <a:r>
+              <a:rPr lang="en-GB" dirty="0"/>
+              <a:t>Spring 2016</a:t>
+            </a:r>
+          </a:p>
+          <a:p>
+            <a:r>
+              <a:rPr lang="en-GB" dirty="0"/>
               <a:t>Mentor: Alex Chao</a:t>
             </a:r>
-            <a:endParaRPr lang="en-GB" dirty="0"/>
           </a:p>
         </p:txBody>
       </p:sp>
@@ -4284,10 +4257,9 @@
           <a:lstStyle/>
           <a:p>
             <a:r>
-              <a:rPr lang="en-GB" dirty="0" smtClean="0"/>
+              <a:rPr lang="en-GB" dirty="0"/>
               <a:t>Approach</a:t>
             </a:r>
-            <a:endParaRPr lang="en-GB" dirty="0"/>
           </a:p>
         </p:txBody>
       </p:sp>
@@ -4315,7 +4287,7 @@
               <a:buAutoNum type="arabicPeriod"/>
             </a:pPr>
             <a:r>
-              <a:rPr lang="en-GB" dirty="0" smtClean="0"/>
+              <a:rPr lang="en-GB" dirty="0"/>
               <a:t>Implement transfer learning approach on Convolutional Neural Networks for image feature extraction</a:t>
             </a:r>
           </a:p>
@@ -4324,15 +4296,15 @@
               <a:buAutoNum type="arabicPeriod"/>
             </a:pPr>
             <a:r>
-              <a:rPr lang="en-GB" dirty="0" smtClean="0"/>
+              <a:rPr lang="en-GB" dirty="0"/>
               <a:t>Create mean feature vector for each business id (dealing with </a:t>
             </a:r>
             <a:r>
-              <a:rPr lang="en-GB" b="1" dirty="0" smtClean="0"/>
+              <a:rPr lang="en-GB" b="1" dirty="0"/>
               <a:t>the multi-instance aspect</a:t>
             </a:r>
             <a:r>
-              <a:rPr lang="en-GB" dirty="0" smtClean="0"/>
+              <a:rPr lang="en-GB" dirty="0"/>
               <a:t> of the problem)</a:t>
             </a:r>
           </a:p>
@@ -4341,40 +4313,26 @@
               <a:buAutoNum type="arabicPeriod"/>
             </a:pPr>
             <a:r>
-              <a:rPr lang="en-GB" dirty="0" smtClean="0"/>
-              <a:t>Train One vs Rest classifier on top of several supervised learning </a:t>
-            </a:r>
-            <a:r>
               <a:rPr lang="en-GB" dirty="0"/>
-              <a:t>models (dealing with </a:t>
+              <a:t>Train One vs Rest classifier on top of several supervised learning models (dealing with </a:t>
             </a:r>
             <a:r>
               <a:rPr lang="en-GB" b="1" dirty="0"/>
-              <a:t>the </a:t>
-            </a:r>
-            <a:r>
-              <a:rPr lang="en-GB" b="1" dirty="0" smtClean="0"/>
-              <a:t>multi-class </a:t>
-            </a:r>
-            <a:r>
-              <a:rPr lang="en-GB" b="1" dirty="0"/>
-              <a:t>aspect</a:t>
+              <a:t>the multi-class aspect</a:t>
             </a:r>
             <a:r>
               <a:rPr lang="en-GB" dirty="0"/>
               <a:t> of the problem)  </a:t>
             </a:r>
-            <a:endParaRPr lang="en-GB" dirty="0" smtClean="0"/>
           </a:p>
           <a:p>
             <a:pPr marL="457200" indent="-457200">
               <a:buAutoNum type="arabicPeriod"/>
             </a:pPr>
             <a:r>
-              <a:rPr lang="en-GB" dirty="0" smtClean="0"/>
+              <a:rPr lang="en-GB" dirty="0"/>
               <a:t>Try ensemble models for improvement of prediction</a:t>
             </a:r>
-            <a:endParaRPr lang="en-GB" dirty="0"/>
           </a:p>
         </p:txBody>
       </p:sp>
@@ -4461,14 +4419,9 @@
           <a:lstStyle/>
           <a:p>
             <a:r>
-              <a:rPr lang="en-GB" dirty="0" smtClean="0"/>
-              <a:t>Convolutional Neural </a:t>
-            </a:r>
-            <a:r>
-              <a:rPr lang="en-GB" dirty="0" smtClean="0"/>
-              <a:t>Networks (CNN)</a:t>
-            </a:r>
-            <a:endParaRPr lang="en-GB" dirty="0"/>
+              <a:rPr lang="en-GB" dirty="0"/>
+              <a:t>Convolutional Neural Networks (CNN)</a:t>
+            </a:r>
           </a:p>
         </p:txBody>
       </p:sp>
@@ -4493,49 +4446,27 @@
           <a:lstStyle/>
           <a:p>
             <a:r>
-              <a:rPr lang="en-GB" dirty="0" smtClean="0"/>
-              <a:t>A </a:t>
-            </a:r>
-            <a:r>
               <a:rPr lang="en-GB" dirty="0"/>
-              <a:t>very powerful </a:t>
-            </a:r>
-            <a:r>
-              <a:rPr lang="en-GB" dirty="0" smtClean="0"/>
-              <a:t>deep learning technique in computer vision (fast and works well)</a:t>
-            </a:r>
-          </a:p>
-          <a:p>
-            <a:r>
-              <a:rPr lang="en-GB" dirty="0" smtClean="0"/>
-              <a:t>CNN takes image as </a:t>
-            </a:r>
+              <a:t>A very powerful deep learning technique in computer vision (fast and works well)</a:t>
+            </a:r>
+          </a:p>
+          <a:p>
             <a:r>
               <a:rPr lang="en-GB" dirty="0"/>
-              <a:t>an input </a:t>
-            </a:r>
-            <a:endParaRPr lang="en-GB" dirty="0" smtClean="0"/>
-          </a:p>
-          <a:p>
-            <a:r>
-              <a:rPr lang="en-GB" dirty="0" smtClean="0"/>
-              <a:t>“Neurons” are organized </a:t>
-            </a:r>
+              <a:t>CNN takes image as an input </a:t>
+            </a:r>
+          </a:p>
+          <a:p>
             <a:r>
               <a:rPr lang="en-GB" dirty="0"/>
-              <a:t>in three </a:t>
-            </a:r>
-            <a:r>
-              <a:rPr lang="en-GB" dirty="0" smtClean="0"/>
-              <a:t>dimensions</a:t>
-            </a:r>
-          </a:p>
-          <a:p>
-            <a:r>
-              <a:rPr lang="en-GB" b="1" dirty="0" smtClean="0"/>
+              <a:t>“Neurons” are organized in three dimensions</a:t>
+            </a:r>
+          </a:p>
+          <a:p>
+            <a:r>
+              <a:rPr lang="en-GB" b="1" dirty="0"/>
               <a:t>Pre-trained CNNs can be used as an image feature extractor</a:t>
             </a:r>
-            <a:endParaRPr lang="en-GB" b="1" dirty="0"/>
           </a:p>
         </p:txBody>
       </p:sp>
@@ -4631,10 +4562,9 @@
           <a:lstStyle/>
           <a:p>
             <a:r>
-              <a:rPr lang="en-GB" dirty="0" smtClean="0"/>
+              <a:rPr lang="en-GB" dirty="0"/>
               <a:t>An image going through a CNN…</a:t>
             </a:r>
-            <a:endParaRPr lang="en-GB" dirty="0"/>
           </a:p>
         </p:txBody>
       </p:sp>
@@ -4720,14 +4650,9 @@
           <a:lstStyle/>
           <a:p>
             <a:r>
-              <a:rPr lang="en-GB" dirty="0" smtClean="0"/>
-              <a:t>Convolutional Neural </a:t>
-            </a:r>
-            <a:r>
-              <a:rPr lang="en-GB" dirty="0" smtClean="0"/>
-              <a:t>Networks (CNN)</a:t>
-            </a:r>
-            <a:endParaRPr lang="en-GB" dirty="0"/>
+              <a:rPr lang="en-GB" dirty="0"/>
+              <a:t>Convolutional Neural Networks (CNN)</a:t>
+            </a:r>
           </a:p>
         </p:txBody>
       </p:sp>
@@ -4825,10 +4750,9 @@
           <a:lstStyle/>
           <a:p>
             <a:r>
-              <a:rPr lang="en-GB" sz="2000" dirty="0" smtClean="0"/>
+              <a:rPr lang="en-GB" sz="2000" dirty="0"/>
               <a:t>CNN architecture example</a:t>
             </a:r>
-            <a:endParaRPr lang="en-GB" sz="2000" dirty="0"/>
           </a:p>
         </p:txBody>
       </p:sp>
@@ -4929,10 +4853,9 @@
           <a:lstStyle/>
           <a:p>
             <a:r>
-              <a:rPr lang="en-GB" b="1" dirty="0" smtClean="0"/>
+              <a:rPr lang="en-GB" b="1" dirty="0"/>
               <a:t>Outcome from this layers can be used as an image feature vector (CNN code)!</a:t>
             </a:r>
-            <a:endParaRPr lang="en-GB" b="1" dirty="0"/>
           </a:p>
         </p:txBody>
       </p:sp>
@@ -4958,12 +4881,8 @@
           <a:lstStyle/>
           <a:p>
             <a:r>
-              <a:rPr lang="en-GB" sz="1200" dirty="0" smtClean="0"/>
-              <a:t>from Deep </a:t>
-            </a:r>
-            <a:r>
               <a:rPr lang="en-GB" sz="1200" dirty="0"/>
-              <a:t>Representation Learning with Target Coding </a:t>
+              <a:t>from Deep Representation Learning with Target Coding </a:t>
             </a:r>
           </a:p>
           <a:p>
@@ -5033,10 +4952,9 @@
           <a:lstStyle/>
           <a:p>
             <a:r>
-              <a:rPr lang="en-GB" dirty="0" smtClean="0"/>
+              <a:rPr lang="en-GB" dirty="0"/>
               <a:t>Pre-trained CNN used in the project</a:t>
             </a:r>
-            <a:endParaRPr lang="en-GB" dirty="0"/>
           </a:p>
         </p:txBody>
       </p:sp>
@@ -5097,15 +5015,7 @@
           <a:p>
             <a:r>
               <a:rPr lang="en-GB" b="1" dirty="0"/>
-              <a:t>Visual Geometry </a:t>
-            </a:r>
-            <a:r>
-              <a:rPr lang="en-GB" b="1" dirty="0" smtClean="0"/>
-              <a:t>Group (VGG) CNN model </a:t>
-            </a:r>
-            <a:r>
-              <a:rPr lang="en-GB" b="1" dirty="0"/>
-              <a:t>developed by Karen </a:t>
+              <a:t>Visual Geometry Group (VGG) CNN model developed by Karen </a:t>
             </a:r>
             <a:r>
               <a:rPr lang="en-GB" b="1" dirty="0" err="1"/>
@@ -5117,11 +5027,7 @@
             </a:r>
             <a:r>
               <a:rPr lang="en-GB" dirty="0"/>
-              <a:t> </a:t>
-            </a:r>
-            <a:r>
-              <a:rPr lang="en-GB" dirty="0"/>
-              <a:t> </a:t>
+              <a:t>  </a:t>
             </a:r>
             <a:r>
               <a:rPr lang="en-GB" b="1" dirty="0"/>
@@ -5157,16 +5063,8 @@
               <a:buChar char="•"/>
             </a:pPr>
             <a:r>
-              <a:rPr lang="en-GB" dirty="0" smtClean="0"/>
-              <a:t>Trained </a:t>
-            </a:r>
-            <a:r>
               <a:rPr lang="en-GB" dirty="0"/>
-              <a:t>on the ImageNet data set (1.2 million images with 1000 categories</a:t>
-            </a:r>
-            <a:r>
-              <a:rPr lang="en-GB" dirty="0" smtClean="0"/>
-              <a:t>)</a:t>
+              <a:t>Trained on the ImageNet data set (1.2 million images with 1000 categories)</a:t>
             </a:r>
           </a:p>
           <a:p>
@@ -5176,19 +5074,7 @@
             </a:pPr>
             <a:r>
               <a:rPr lang="en-GB" dirty="0"/>
-              <a:t> </a:t>
-            </a:r>
-            <a:r>
-              <a:rPr lang="en-GB" dirty="0" smtClean="0"/>
-              <a:t>Runner-up </a:t>
-            </a:r>
-            <a:r>
-              <a:rPr lang="en-GB" dirty="0"/>
-              <a:t>for the Large Scale Visual Recognition Challenge </a:t>
-            </a:r>
-            <a:r>
-              <a:rPr lang="en-GB" dirty="0" smtClean="0"/>
-              <a:t>2014</a:t>
+              <a:t> Runner-up for the Large Scale Visual Recognition Challenge 2014</a:t>
             </a:r>
           </a:p>
           <a:p>
@@ -5206,15 +5092,7 @@
             </a:r>
             <a:r>
               <a:rPr lang="en-GB" dirty="0"/>
-              <a:t> features </a:t>
-            </a:r>
-            <a:r>
-              <a:rPr lang="en-GB" dirty="0" smtClean="0"/>
-              <a:t>perform well </a:t>
-            </a:r>
-            <a:r>
-              <a:rPr lang="en-GB" dirty="0"/>
-              <a:t>in multiple transfer learning tasks </a:t>
+              <a:t> features perform well in multiple transfer learning tasks </a:t>
             </a:r>
           </a:p>
         </p:txBody>
@@ -5235,7 +5113,7 @@
         </p:blipFill>
         <p:spPr>
           <a:xfrm>
-            <a:off x="1295400" y="4114800"/>
+            <a:off x="1447800" y="4007689"/>
             <a:ext cx="6264000" cy="2351942"/>
           </a:xfrm>
           <a:prstGeom prst="rect">
@@ -5296,10 +5174,9 @@
           <a:lstStyle/>
           <a:p>
             <a:r>
-              <a:rPr lang="en-GB" sz="4000" dirty="0" smtClean="0"/>
+              <a:rPr lang="en-GB" sz="4000" dirty="0"/>
               <a:t>If you run Yelp images through VGG CNN model and get scores…</a:t>
             </a:r>
-            <a:endParaRPr lang="en-GB" sz="4000" dirty="0"/>
           </a:p>
         </p:txBody>
       </p:sp>
@@ -5356,11 +5233,11 @@
           <a:lstStyle/>
           <a:p>
             <a:r>
-              <a:rPr lang="en-GB" dirty="0" smtClean="0"/>
+              <a:rPr lang="en-GB" dirty="0"/>
               <a:t>All of them are food related </a:t>
             </a:r>
             <a:r>
-              <a:rPr lang="en-GB" dirty="0" smtClean="0">
+              <a:rPr lang="en-GB" dirty="0">
                 <a:sym typeface="Wingdings" panose="05000000000000000000" pitchFamily="2" charset="2"/>
               </a:rPr>
               <a:t></a:t>
@@ -5422,10 +5299,9 @@
           <a:lstStyle/>
           <a:p>
             <a:r>
-              <a:rPr lang="en-GB" sz="4800" dirty="0" smtClean="0"/>
+              <a:rPr lang="en-GB" sz="4800" dirty="0"/>
               <a:t>Extracting features from CNN</a:t>
             </a:r>
-            <a:endParaRPr lang="en-GB" sz="4800" dirty="0"/>
           </a:p>
         </p:txBody>
       </p:sp>
@@ -5662,10 +5538,9 @@
           <a:p>
             <a:pPr algn="ctr"/>
             <a:r>
-              <a:rPr lang="en-GB" dirty="0" smtClean="0"/>
+              <a:rPr lang="en-GB" dirty="0"/>
               <a:t>VGG CNN</a:t>
             </a:r>
-            <a:endParaRPr lang="en-GB" dirty="0"/>
           </a:p>
         </p:txBody>
       </p:sp>
@@ -5766,10 +5641,9 @@
           <a:lstStyle/>
           <a:p>
             <a:r>
-              <a:rPr lang="en-GB" dirty="0" smtClean="0"/>
+              <a:rPr lang="en-GB" dirty="0"/>
               <a:t>CNN code 1</a:t>
             </a:r>
-            <a:endParaRPr lang="en-GB" dirty="0"/>
           </a:p>
         </p:txBody>
       </p:sp>
@@ -5796,10 +5670,9 @@
           <a:lstStyle/>
           <a:p>
             <a:r>
-              <a:rPr lang="en-GB" dirty="0" smtClean="0"/>
+              <a:rPr lang="en-GB" dirty="0"/>
               <a:t>CNN code 2</a:t>
             </a:r>
-            <a:endParaRPr lang="en-GB" dirty="0"/>
           </a:p>
         </p:txBody>
       </p:sp>
@@ -5826,10 +5699,9 @@
           <a:lstStyle/>
           <a:p>
             <a:r>
-              <a:rPr lang="en-GB" dirty="0" smtClean="0"/>
+              <a:rPr lang="en-GB" dirty="0"/>
               <a:t>CNN code 3</a:t>
             </a:r>
-            <a:endParaRPr lang="en-GB" dirty="0"/>
           </a:p>
         </p:txBody>
       </p:sp>
@@ -5856,10 +5728,9 @@
           <a:lstStyle/>
           <a:p>
             <a:r>
-              <a:rPr lang="en-GB" dirty="0" smtClean="0"/>
+              <a:rPr lang="en-GB" dirty="0"/>
               <a:t>CNN code 4</a:t>
             </a:r>
-            <a:endParaRPr lang="en-GB" dirty="0"/>
           </a:p>
         </p:txBody>
       </p:sp>
@@ -5886,10 +5757,9 @@
           <a:lstStyle/>
           <a:p>
             <a:r>
-              <a:rPr lang="en-GB" dirty="0" smtClean="0"/>
+              <a:rPr lang="en-GB" dirty="0"/>
               <a:t>1</a:t>
             </a:r>
-            <a:endParaRPr lang="en-GB" dirty="0"/>
           </a:p>
         </p:txBody>
       </p:sp>
@@ -5916,10 +5786,9 @@
           <a:lstStyle/>
           <a:p>
             <a:r>
-              <a:rPr lang="en-GB" dirty="0" smtClean="0"/>
+              <a:rPr lang="en-GB" dirty="0"/>
               <a:t>2</a:t>
             </a:r>
-            <a:endParaRPr lang="en-GB" dirty="0"/>
           </a:p>
         </p:txBody>
       </p:sp>
@@ -5946,10 +5815,9 @@
           <a:lstStyle/>
           <a:p>
             <a:r>
-              <a:rPr lang="en-GB" dirty="0" smtClean="0"/>
+              <a:rPr lang="en-GB" dirty="0"/>
               <a:t>3</a:t>
             </a:r>
-            <a:endParaRPr lang="en-GB" dirty="0"/>
           </a:p>
         </p:txBody>
       </p:sp>
@@ -5976,10 +5844,9 @@
           <a:lstStyle/>
           <a:p>
             <a:r>
-              <a:rPr lang="en-GB" dirty="0" smtClean="0"/>
+              <a:rPr lang="en-GB" dirty="0"/>
               <a:t>4</a:t>
             </a:r>
-            <a:endParaRPr lang="en-GB" dirty="0"/>
           </a:p>
         </p:txBody>
       </p:sp>
@@ -6055,10 +5922,9 @@
           <a:p>
             <a:pPr algn="ctr"/>
             <a:r>
-              <a:rPr lang="en-GB" dirty="0" smtClean="0"/>
+              <a:rPr lang="en-GB" dirty="0"/>
               <a:t>Mean CNN code for a business id</a:t>
             </a:r>
-            <a:endParaRPr lang="en-GB" dirty="0"/>
           </a:p>
         </p:txBody>
       </p:sp>
@@ -6086,10 +5952,9 @@
           <a:p>
             <a:pPr algn="ctr"/>
             <a:r>
-              <a:rPr lang="en-GB" dirty="0" smtClean="0"/>
+              <a:rPr lang="en-GB" dirty="0"/>
               <a:t>Photos corresponding to a business id</a:t>
             </a:r>
-            <a:endParaRPr lang="en-GB" dirty="0"/>
           </a:p>
         </p:txBody>
       </p:sp>
@@ -6146,10 +6011,9 @@
           <a:lstStyle/>
           <a:p>
             <a:r>
-              <a:rPr lang="en-GB" sz="4800" dirty="0" smtClean="0"/>
+              <a:rPr lang="en-GB" sz="4800" dirty="0"/>
               <a:t>Multi-class classification</a:t>
             </a:r>
-            <a:endParaRPr lang="en-GB" sz="4800" dirty="0"/>
           </a:p>
         </p:txBody>
       </p:sp>
@@ -6180,7 +6044,7 @@
               <a:buChar char="§"/>
             </a:pPr>
             <a:r>
-              <a:rPr lang="en-GB" sz="2800" dirty="0" smtClean="0"/>
+              <a:rPr lang="en-GB" sz="2800" dirty="0"/>
               <a:t>Logistic Regression</a:t>
             </a:r>
           </a:p>
@@ -6190,7 +6054,7 @@
               <a:buChar char="§"/>
             </a:pPr>
             <a:r>
-              <a:rPr lang="en-GB" sz="2800" dirty="0" smtClean="0"/>
+              <a:rPr lang="en-GB" sz="2800" dirty="0"/>
               <a:t>Support Vector Classifier</a:t>
             </a:r>
           </a:p>
@@ -6200,7 +6064,7 @@
               <a:buChar char="§"/>
             </a:pPr>
             <a:r>
-              <a:rPr lang="en-GB" sz="2800" dirty="0" smtClean="0"/>
+              <a:rPr lang="en-GB" sz="2800" dirty="0"/>
               <a:t>Decision Tree</a:t>
             </a:r>
           </a:p>
@@ -6210,7 +6074,7 @@
               <a:buChar char="§"/>
             </a:pPr>
             <a:r>
-              <a:rPr lang="en-GB" sz="2800" dirty="0" smtClean="0"/>
+              <a:rPr lang="en-GB" sz="2800" dirty="0"/>
               <a:t>K Nearest Neighbour</a:t>
             </a:r>
           </a:p>
@@ -6220,10 +6084,9 @@
               <a:buChar char="§"/>
             </a:pPr>
             <a:r>
-              <a:rPr lang="en-GB" sz="2800" dirty="0" smtClean="0"/>
+              <a:rPr lang="en-GB" sz="2800" dirty="0"/>
               <a:t>Gaussian Naïve Bayes</a:t>
             </a:r>
-            <a:endParaRPr lang="en-GB" sz="2800" dirty="0"/>
           </a:p>
         </p:txBody>
       </p:sp>
@@ -6250,10 +6113,9 @@
           <a:lstStyle/>
           <a:p>
             <a:r>
-              <a:rPr lang="en-GB" sz="3600" b="1" dirty="0" smtClean="0"/>
+              <a:rPr lang="en-GB" sz="3600" b="1" dirty="0"/>
               <a:t>plus</a:t>
             </a:r>
-            <a:endParaRPr lang="en-GB" sz="3600" b="1" dirty="0"/>
           </a:p>
         </p:txBody>
       </p:sp>
@@ -6281,10 +6143,9 @@
           <a:p>
             <a:pPr algn="ctr"/>
             <a:r>
-              <a:rPr lang="en-GB" sz="2800" dirty="0" smtClean="0"/>
+              <a:rPr lang="en-GB" sz="2800" dirty="0"/>
               <a:t>One vs Rest Classifier</a:t>
             </a:r>
-            <a:endParaRPr lang="en-GB" sz="2800" dirty="0"/>
           </a:p>
         </p:txBody>
       </p:sp>
@@ -6311,16 +6172,15 @@
           <a:lstStyle/>
           <a:p>
             <a:r>
-              <a:rPr lang="en-GB" dirty="0" smtClean="0"/>
+              <a:rPr lang="en-GB" dirty="0"/>
               <a:t>PCA decomposition on 100 components was applied </a:t>
             </a:r>
           </a:p>
           <a:p>
             <a:r>
-              <a:rPr lang="en-GB" dirty="0" smtClean="0"/>
+              <a:rPr lang="en-GB" dirty="0"/>
               <a:t>(better performance and faster model training)</a:t>
             </a:r>
-            <a:endParaRPr lang="en-GB" dirty="0"/>
           </a:p>
         </p:txBody>
       </p:sp>
@@ -6377,10 +6237,9 @@
           <a:lstStyle/>
           <a:p>
             <a:r>
-              <a:rPr lang="en-GB" sz="4800" dirty="0" smtClean="0"/>
+              <a:rPr lang="en-GB" sz="4800" dirty="0"/>
               <a:t>Multi-class classification: results on cross validation</a:t>
             </a:r>
-            <a:endParaRPr lang="en-GB" sz="4800" dirty="0"/>
           </a:p>
         </p:txBody>
       </p:sp>
@@ -6409,8 +6268,20 @@
                 <a:tableStyleId>{5C22544A-7EE6-4342-B048-85BDC9FD1C3A}</a:tableStyleId>
               </a:tblPr>
               <a:tblGrid>
-                <a:gridCol w="2743200"/>
-                <a:gridCol w="2743200"/>
+                <a:gridCol w="2743200">
+                  <a:extLst>
+                    <a:ext uri="{9D8B030D-6E8A-4147-A177-3AD203B41FA5}">
+                      <a16:colId xmlns:a16="http://schemas.microsoft.com/office/drawing/2014/main" val="20000"/>
+                    </a:ext>
+                  </a:extLst>
+                </a:gridCol>
+                <a:gridCol w="2743200">
+                  <a:extLst>
+                    <a:ext uri="{9D8B030D-6E8A-4147-A177-3AD203B41FA5}">
+                      <a16:colId xmlns:a16="http://schemas.microsoft.com/office/drawing/2014/main" val="20001"/>
+                    </a:ext>
+                  </a:extLst>
+                </a:gridCol>
               </a:tblGrid>
               <a:tr h="0">
                 <a:tc>
@@ -6457,13 +6328,7 @@
                         <a:rPr lang="en-GB" sz="1800" dirty="0">
                           <a:effectLst/>
                         </a:rPr>
-                        <a:t>Mean </a:t>
-                      </a:r>
-                      <a:r>
-                        <a:rPr lang="en-GB" sz="1800" dirty="0" smtClean="0">
-                          <a:effectLst/>
-                        </a:rPr>
-                        <a:t>f-score</a:t>
+                        <a:t>Mean f-score</a:t>
                       </a:r>
                       <a:endParaRPr lang="en-GB" sz="1600" dirty="0">
                         <a:effectLst/>
@@ -6473,6 +6338,11 @@
                   </a:txBody>
                   <a:tcPr marL="68580" marR="68580" marT="0" marB="0"/>
                 </a:tc>
+                <a:extLst>
+                  <a:ext uri="{0D108BD9-81ED-4DB2-BD59-A6C34878D82A}">
+                    <a16:rowId xmlns:a16="http://schemas.microsoft.com/office/drawing/2014/main" val="10000"/>
+                  </a:ext>
+                </a:extLst>
               </a:tr>
               <a:tr h="0">
                 <a:tc>
@@ -6529,6 +6399,11 @@
                   </a:txBody>
                   <a:tcPr marL="68580" marR="68580" marT="0" marB="0"/>
                 </a:tc>
+                <a:extLst>
+                  <a:ext uri="{0D108BD9-81ED-4DB2-BD59-A6C34878D82A}">
+                    <a16:rowId xmlns:a16="http://schemas.microsoft.com/office/drawing/2014/main" val="10001"/>
+                  </a:ext>
+                </a:extLst>
               </a:tr>
               <a:tr h="0">
                 <a:tc>
@@ -6585,6 +6460,11 @@
                   </a:txBody>
                   <a:tcPr marL="68580" marR="68580" marT="0" marB="0"/>
                 </a:tc>
+                <a:extLst>
+                  <a:ext uri="{0D108BD9-81ED-4DB2-BD59-A6C34878D82A}">
+                    <a16:rowId xmlns:a16="http://schemas.microsoft.com/office/drawing/2014/main" val="10002"/>
+                  </a:ext>
+                </a:extLst>
               </a:tr>
               <a:tr h="0">
                 <a:tc>
@@ -6641,6 +6521,11 @@
                   </a:txBody>
                   <a:tcPr marL="68580" marR="68580" marT="0" marB="0"/>
                 </a:tc>
+                <a:extLst>
+                  <a:ext uri="{0D108BD9-81ED-4DB2-BD59-A6C34878D82A}">
+                    <a16:rowId xmlns:a16="http://schemas.microsoft.com/office/drawing/2014/main" val="10003"/>
+                  </a:ext>
+                </a:extLst>
               </a:tr>
               <a:tr h="0">
                 <a:tc>
@@ -6697,6 +6582,11 @@
                   </a:txBody>
                   <a:tcPr marL="68580" marR="68580" marT="0" marB="0"/>
                 </a:tc>
+                <a:extLst>
+                  <a:ext uri="{0D108BD9-81ED-4DB2-BD59-A6C34878D82A}">
+                    <a16:rowId xmlns:a16="http://schemas.microsoft.com/office/drawing/2014/main" val="10004"/>
+                  </a:ext>
+                </a:extLst>
               </a:tr>
               <a:tr h="0">
                 <a:tc>
@@ -6753,6 +6643,11 @@
                   </a:txBody>
                   <a:tcPr marL="68580" marR="68580" marT="0" marB="0"/>
                 </a:tc>
+                <a:extLst>
+                  <a:ext uri="{0D108BD9-81ED-4DB2-BD59-A6C34878D82A}">
+                    <a16:rowId xmlns:a16="http://schemas.microsoft.com/office/drawing/2014/main" val="10005"/>
+                  </a:ext>
+                </a:extLst>
               </a:tr>
             </a:tbl>
           </a:graphicData>
@@ -6781,10 +6676,9 @@
           <a:lstStyle/>
           <a:p>
             <a:r>
-              <a:rPr lang="en-GB" dirty="0" smtClean="0"/>
+              <a:rPr lang="en-GB" dirty="0"/>
               <a:t>K-fold cross validation using 5 folds</a:t>
             </a:r>
-            <a:endParaRPr lang="en-GB" dirty="0"/>
           </a:p>
         </p:txBody>
       </p:sp>
@@ -6841,17 +6735,16 @@
           <a:lstStyle/>
           <a:p>
             <a:r>
-              <a:rPr lang="en-GB" sz="4800" dirty="0" smtClean="0"/>
+              <a:rPr lang="en-GB" sz="4800" dirty="0"/>
               <a:t>Ensemble learning:</a:t>
             </a:r>
             <a:br>
-              <a:rPr lang="en-GB" sz="4800" dirty="0" smtClean="0"/>
+              <a:rPr lang="en-GB" sz="4800" dirty="0"/>
             </a:br>
             <a:r>
-              <a:rPr lang="en-GB" sz="4800" dirty="0" smtClean="0"/>
+              <a:rPr lang="en-GB" sz="4800" dirty="0"/>
               <a:t>Approach 1</a:t>
             </a:r>
-            <a:endParaRPr lang="en-GB" sz="4800" dirty="0"/>
           </a:p>
         </p:txBody>
       </p:sp>
@@ -7079,18 +6972,13 @@
           <a:p>
             <a:pPr algn="ctr"/>
             <a:r>
-              <a:rPr lang="en-GB" b="1" dirty="0" smtClean="0">
+              <a:rPr lang="en-GB" b="1" dirty="0">
                 <a:solidFill>
                   <a:schemeClr val="bg1"/>
                 </a:solidFill>
               </a:rPr>
               <a:t>Logistic Regression</a:t>
             </a:r>
-            <a:endParaRPr lang="en-GB" b="1" dirty="0">
-              <a:solidFill>
-                <a:schemeClr val="bg1"/>
-              </a:solidFill>
-            </a:endParaRPr>
           </a:p>
         </p:txBody>
       </p:sp>
@@ -7118,18 +7006,13 @@
           <a:p>
             <a:pPr algn="ctr"/>
             <a:r>
-              <a:rPr lang="en-GB" b="1" dirty="0" smtClean="0">
+              <a:rPr lang="en-GB" b="1" dirty="0">
                 <a:solidFill>
                   <a:schemeClr val="bg1"/>
                 </a:solidFill>
               </a:rPr>
               <a:t>Support Vector Classifier</a:t>
             </a:r>
-            <a:endParaRPr lang="en-GB" b="1" dirty="0">
-              <a:solidFill>
-                <a:schemeClr val="bg1"/>
-              </a:solidFill>
-            </a:endParaRPr>
           </a:p>
         </p:txBody>
       </p:sp>
@@ -7157,18 +7040,13 @@
           <a:p>
             <a:pPr algn="ctr"/>
             <a:r>
-              <a:rPr lang="en-GB" b="1" dirty="0" smtClean="0">
+              <a:rPr lang="en-GB" b="1" dirty="0">
                 <a:solidFill>
                   <a:schemeClr val="bg1"/>
                 </a:solidFill>
               </a:rPr>
               <a:t>Decision tree</a:t>
             </a:r>
-            <a:endParaRPr lang="en-GB" b="1" dirty="0">
-              <a:solidFill>
-                <a:schemeClr val="bg1"/>
-              </a:solidFill>
-            </a:endParaRPr>
           </a:p>
         </p:txBody>
       </p:sp>
@@ -7195,7 +7073,7 @@
           <a:p>
             <a:pPr algn="ctr"/>
             <a:r>
-              <a:rPr lang="en-GB" b="1" dirty="0" smtClean="0">
+              <a:rPr lang="en-GB" b="1" dirty="0">
                 <a:solidFill>
                   <a:schemeClr val="bg1"/>
                 </a:solidFill>
@@ -7206,18 +7084,13 @@
           <a:p>
             <a:pPr algn="ctr"/>
             <a:r>
-              <a:rPr lang="en-GB" b="1" dirty="0" smtClean="0">
+              <a:rPr lang="en-GB" b="1" dirty="0">
                 <a:solidFill>
                   <a:schemeClr val="bg1"/>
                 </a:solidFill>
               </a:rPr>
               <a:t>Neighbour</a:t>
             </a:r>
-            <a:endParaRPr lang="en-GB" b="1" dirty="0">
-              <a:solidFill>
-                <a:schemeClr val="bg1"/>
-              </a:solidFill>
-            </a:endParaRPr>
           </a:p>
         </p:txBody>
       </p:sp>
@@ -7244,7 +7117,7 @@
           <a:p>
             <a:pPr algn="ctr"/>
             <a:r>
-              <a:rPr lang="en-GB" b="1" dirty="0" smtClean="0">
+              <a:rPr lang="en-GB" b="1" dirty="0">
                 <a:solidFill>
                   <a:schemeClr val="bg1"/>
                 </a:solidFill>
@@ -7255,18 +7128,13 @@
           <a:p>
             <a:pPr algn="ctr"/>
             <a:r>
-              <a:rPr lang="en-GB" b="1" dirty="0" smtClean="0">
+              <a:rPr lang="en-GB" b="1" dirty="0">
                 <a:solidFill>
                   <a:schemeClr val="bg1"/>
                 </a:solidFill>
               </a:rPr>
               <a:t>Naïve Bayes</a:t>
             </a:r>
-            <a:endParaRPr lang="en-GB" b="1" dirty="0">
-              <a:solidFill>
-                <a:schemeClr val="bg1"/>
-              </a:solidFill>
-            </a:endParaRPr>
           </a:p>
         </p:txBody>
       </p:sp>
@@ -7502,10 +7370,9 @@
           <a:p>
             <a:pPr algn="ctr"/>
             <a:r>
-              <a:rPr lang="en-GB" sz="3200" b="1" dirty="0" smtClean="0"/>
+              <a:rPr lang="en-GB" sz="3200" b="1" dirty="0"/>
               <a:t>Vote!</a:t>
             </a:r>
-            <a:endParaRPr lang="en-GB" sz="3200" b="1" dirty="0"/>
           </a:p>
         </p:txBody>
       </p:sp>
@@ -7532,10 +7399,9 @@
           <a:lstStyle/>
           <a:p>
             <a:r>
-              <a:rPr lang="en-GB" dirty="0" smtClean="0"/>
+              <a:rPr lang="en-GB" dirty="0"/>
               <a:t>Ensemble all predictions and do majority vote</a:t>
             </a:r>
-            <a:endParaRPr lang="en-GB" dirty="0"/>
           </a:p>
         </p:txBody>
       </p:sp>
@@ -7592,17 +7458,16 @@
           <a:lstStyle/>
           <a:p>
             <a:r>
-              <a:rPr lang="en-GB" sz="4800" dirty="0" smtClean="0"/>
+              <a:rPr lang="en-GB" sz="4800" dirty="0"/>
               <a:t>Ensemble learning:</a:t>
             </a:r>
             <a:br>
-              <a:rPr lang="en-GB" sz="4800" dirty="0" smtClean="0"/>
+              <a:rPr lang="en-GB" sz="4800" dirty="0"/>
             </a:br>
             <a:r>
-              <a:rPr lang="en-GB" sz="4800" dirty="0" smtClean="0"/>
+              <a:rPr lang="en-GB" sz="4800" dirty="0"/>
               <a:t>Approach 2</a:t>
             </a:r>
-            <a:endParaRPr lang="en-GB" sz="4800" dirty="0"/>
           </a:p>
         </p:txBody>
       </p:sp>
@@ -7830,18 +7695,13 @@
           <a:p>
             <a:pPr algn="ctr"/>
             <a:r>
-              <a:rPr lang="en-GB" b="1" dirty="0" smtClean="0">
+              <a:rPr lang="en-GB" b="1" dirty="0">
                 <a:solidFill>
                   <a:schemeClr val="bg1"/>
                 </a:solidFill>
               </a:rPr>
               <a:t>Logistic Regression</a:t>
             </a:r>
-            <a:endParaRPr lang="en-GB" b="1" dirty="0">
-              <a:solidFill>
-                <a:schemeClr val="bg1"/>
-              </a:solidFill>
-            </a:endParaRPr>
           </a:p>
         </p:txBody>
       </p:sp>
@@ -7869,18 +7729,13 @@
           <a:p>
             <a:pPr algn="ctr"/>
             <a:r>
-              <a:rPr lang="en-GB" b="1" dirty="0" smtClean="0">
+              <a:rPr lang="en-GB" b="1" dirty="0">
                 <a:solidFill>
                   <a:schemeClr val="bg1"/>
                 </a:solidFill>
               </a:rPr>
               <a:t>Support Vector Classifier</a:t>
             </a:r>
-            <a:endParaRPr lang="en-GB" b="1" dirty="0">
-              <a:solidFill>
-                <a:schemeClr val="bg1"/>
-              </a:solidFill>
-            </a:endParaRPr>
           </a:p>
         </p:txBody>
       </p:sp>
@@ -7908,18 +7763,13 @@
           <a:p>
             <a:pPr algn="ctr"/>
             <a:r>
-              <a:rPr lang="en-GB" b="1" dirty="0" smtClean="0">
+              <a:rPr lang="en-GB" b="1" dirty="0">
                 <a:solidFill>
                   <a:schemeClr val="bg1"/>
                 </a:solidFill>
               </a:rPr>
               <a:t>Decision tree</a:t>
             </a:r>
-            <a:endParaRPr lang="en-GB" b="1" dirty="0">
-              <a:solidFill>
-                <a:schemeClr val="bg1"/>
-              </a:solidFill>
-            </a:endParaRPr>
           </a:p>
         </p:txBody>
       </p:sp>
@@ -7946,7 +7796,7 @@
           <a:p>
             <a:pPr algn="ctr"/>
             <a:r>
-              <a:rPr lang="en-GB" b="1" dirty="0" smtClean="0">
+              <a:rPr lang="en-GB" b="1" dirty="0">
                 <a:solidFill>
                   <a:schemeClr val="bg1"/>
                 </a:solidFill>
@@ -7957,18 +7807,13 @@
           <a:p>
             <a:pPr algn="ctr"/>
             <a:r>
-              <a:rPr lang="en-GB" b="1" dirty="0" smtClean="0">
+              <a:rPr lang="en-GB" b="1" dirty="0">
                 <a:solidFill>
                   <a:schemeClr val="bg1"/>
                 </a:solidFill>
               </a:rPr>
               <a:t>Neighbour</a:t>
             </a:r>
-            <a:endParaRPr lang="en-GB" b="1" dirty="0">
-              <a:solidFill>
-                <a:schemeClr val="bg1"/>
-              </a:solidFill>
-            </a:endParaRPr>
           </a:p>
         </p:txBody>
       </p:sp>
@@ -7995,7 +7840,7 @@
           <a:p>
             <a:pPr algn="ctr"/>
             <a:r>
-              <a:rPr lang="en-GB" b="1" dirty="0" smtClean="0">
+              <a:rPr lang="en-GB" b="1" dirty="0">
                 <a:solidFill>
                   <a:schemeClr val="bg1"/>
                 </a:solidFill>
@@ -8006,18 +7851,13 @@
           <a:p>
             <a:pPr algn="ctr"/>
             <a:r>
-              <a:rPr lang="en-GB" b="1" dirty="0" smtClean="0">
+              <a:rPr lang="en-GB" b="1" dirty="0">
                 <a:solidFill>
                   <a:schemeClr val="bg1"/>
                 </a:solidFill>
               </a:rPr>
               <a:t>Naïve Bayes</a:t>
             </a:r>
-            <a:endParaRPr lang="en-GB" b="1" dirty="0">
-              <a:solidFill>
-                <a:schemeClr val="bg1"/>
-              </a:solidFill>
-            </a:endParaRPr>
           </a:p>
         </p:txBody>
       </p:sp>
@@ -8253,10 +8093,9 @@
           <a:p>
             <a:pPr algn="ctr"/>
             <a:r>
-              <a:rPr lang="en-GB" sz="3200" b="1" dirty="0" smtClean="0"/>
+              <a:rPr lang="en-GB" sz="3200" b="1" dirty="0"/>
               <a:t>Vote!</a:t>
             </a:r>
-            <a:endParaRPr lang="en-GB" sz="3200" b="1" dirty="0"/>
           </a:p>
         </p:txBody>
       </p:sp>
@@ -8283,10 +8122,9 @@
           <a:lstStyle/>
           <a:p>
             <a:r>
-              <a:rPr lang="en-GB" dirty="0" smtClean="0"/>
+              <a:rPr lang="en-GB" dirty="0"/>
               <a:t>Ensemble all predictions and do weighted vote</a:t>
             </a:r>
-            <a:endParaRPr lang="en-GB" dirty="0"/>
           </a:p>
         </p:txBody>
       </p:sp>
@@ -8313,10 +8151,9 @@
           <a:lstStyle/>
           <a:p>
             <a:r>
-              <a:rPr lang="en-GB" dirty="0" smtClean="0"/>
+              <a:rPr lang="en-GB" dirty="0"/>
               <a:t>3</a:t>
             </a:r>
-            <a:endParaRPr lang="en-GB" dirty="0"/>
           </a:p>
         </p:txBody>
       </p:sp>
@@ -8343,10 +8180,9 @@
           <a:lstStyle/>
           <a:p>
             <a:r>
-              <a:rPr lang="en-GB" dirty="0" smtClean="0"/>
+              <a:rPr lang="en-GB" dirty="0"/>
               <a:t>3</a:t>
             </a:r>
-            <a:endParaRPr lang="en-GB" dirty="0"/>
           </a:p>
         </p:txBody>
       </p:sp>
@@ -8373,10 +8209,9 @@
           <a:lstStyle/>
           <a:p>
             <a:r>
-              <a:rPr lang="en-GB" dirty="0" smtClean="0"/>
+              <a:rPr lang="en-GB" dirty="0"/>
               <a:t>2</a:t>
             </a:r>
-            <a:endParaRPr lang="en-GB" dirty="0"/>
           </a:p>
         </p:txBody>
       </p:sp>
@@ -8432,10 +8267,9 @@
           <a:lstStyle/>
           <a:p>
             <a:r>
-              <a:rPr lang="en-GB" dirty="0" smtClean="0"/>
+              <a:rPr lang="en-GB" dirty="0"/>
               <a:t>1</a:t>
             </a:r>
-            <a:endParaRPr lang="en-GB" dirty="0"/>
           </a:p>
         </p:txBody>
       </p:sp>
@@ -8490,10 +8324,9 @@
           <a:lstStyle/>
           <a:p>
             <a:r>
-              <a:rPr lang="en-GB" dirty="0" smtClean="0"/>
+              <a:rPr lang="en-GB" dirty="0"/>
               <a:t>Client</a:t>
             </a:r>
-            <a:endParaRPr lang="en-GB" dirty="0"/>
           </a:p>
         </p:txBody>
       </p:sp>
@@ -8523,11 +8356,7 @@
             </a:r>
             <a:r>
               <a:rPr lang="en-GB" dirty="0"/>
-              <a:t> is an American multinational corporation headquartered in San Francisco, California</a:t>
-            </a:r>
-            <a:r>
-              <a:rPr lang="en-GB" dirty="0" smtClean="0"/>
-              <a:t>.</a:t>
+              <a:t> is an American multinational corporation headquartered in San Francisco, California.</a:t>
             </a:r>
           </a:p>
           <a:p>
@@ -8687,17 +8516,16 @@
           <a:lstStyle/>
           <a:p>
             <a:r>
-              <a:rPr lang="en-GB" sz="4800" dirty="0" smtClean="0"/>
+              <a:rPr lang="en-GB" sz="4800" dirty="0"/>
               <a:t>Ensemble learning:</a:t>
             </a:r>
             <a:br>
-              <a:rPr lang="en-GB" sz="4800" dirty="0" smtClean="0"/>
+              <a:rPr lang="en-GB" sz="4800" dirty="0"/>
             </a:br>
             <a:r>
-              <a:rPr lang="en-GB" sz="4800" dirty="0" smtClean="0"/>
+              <a:rPr lang="en-GB" sz="4800" dirty="0"/>
               <a:t>Approach 3</a:t>
             </a:r>
-            <a:endParaRPr lang="en-GB" sz="4800" dirty="0"/>
           </a:p>
         </p:txBody>
       </p:sp>
@@ -8925,18 +8753,13 @@
           <a:p>
             <a:pPr algn="ctr"/>
             <a:r>
-              <a:rPr lang="en-GB" b="1" dirty="0" smtClean="0">
+              <a:rPr lang="en-GB" b="1" dirty="0">
                 <a:solidFill>
                   <a:schemeClr val="bg1"/>
                 </a:solidFill>
               </a:rPr>
               <a:t>Logistic Regression</a:t>
             </a:r>
-            <a:endParaRPr lang="en-GB" b="1" dirty="0">
-              <a:solidFill>
-                <a:schemeClr val="bg1"/>
-              </a:solidFill>
-            </a:endParaRPr>
           </a:p>
         </p:txBody>
       </p:sp>
@@ -8964,18 +8787,13 @@
           <a:p>
             <a:pPr algn="ctr"/>
             <a:r>
-              <a:rPr lang="en-GB" b="1" dirty="0" smtClean="0">
+              <a:rPr lang="en-GB" b="1" dirty="0">
                 <a:solidFill>
                   <a:schemeClr val="bg1"/>
                 </a:solidFill>
               </a:rPr>
               <a:t>Support Vector Classifier</a:t>
             </a:r>
-            <a:endParaRPr lang="en-GB" b="1" dirty="0">
-              <a:solidFill>
-                <a:schemeClr val="bg1"/>
-              </a:solidFill>
-            </a:endParaRPr>
           </a:p>
         </p:txBody>
       </p:sp>
@@ -9003,18 +8821,13 @@
           <a:p>
             <a:pPr algn="ctr"/>
             <a:r>
-              <a:rPr lang="en-GB" b="1" dirty="0" smtClean="0">
+              <a:rPr lang="en-GB" b="1" dirty="0">
                 <a:solidFill>
                   <a:schemeClr val="bg1"/>
                 </a:solidFill>
               </a:rPr>
               <a:t>Decision tree</a:t>
             </a:r>
-            <a:endParaRPr lang="en-GB" b="1" dirty="0">
-              <a:solidFill>
-                <a:schemeClr val="bg1"/>
-              </a:solidFill>
-            </a:endParaRPr>
           </a:p>
         </p:txBody>
       </p:sp>
@@ -9041,7 +8854,7 @@
           <a:p>
             <a:pPr algn="ctr"/>
             <a:r>
-              <a:rPr lang="en-GB" b="1" dirty="0" smtClean="0">
+              <a:rPr lang="en-GB" b="1" dirty="0">
                 <a:solidFill>
                   <a:schemeClr val="bg1"/>
                 </a:solidFill>
@@ -9052,18 +8865,13 @@
           <a:p>
             <a:pPr algn="ctr"/>
             <a:r>
-              <a:rPr lang="en-GB" b="1" dirty="0" smtClean="0">
+              <a:rPr lang="en-GB" b="1" dirty="0">
                 <a:solidFill>
                   <a:schemeClr val="bg1"/>
                 </a:solidFill>
               </a:rPr>
               <a:t>Neighbour</a:t>
             </a:r>
-            <a:endParaRPr lang="en-GB" b="1" dirty="0">
-              <a:solidFill>
-                <a:schemeClr val="bg1"/>
-              </a:solidFill>
-            </a:endParaRPr>
           </a:p>
         </p:txBody>
       </p:sp>
@@ -9090,7 +8898,7 @@
           <a:p>
             <a:pPr algn="ctr"/>
             <a:r>
-              <a:rPr lang="en-GB" b="1" dirty="0" smtClean="0">
+              <a:rPr lang="en-GB" b="1" dirty="0">
                 <a:solidFill>
                   <a:schemeClr val="bg1"/>
                 </a:solidFill>
@@ -9101,18 +8909,13 @@
           <a:p>
             <a:pPr algn="ctr"/>
             <a:r>
-              <a:rPr lang="en-GB" b="1" dirty="0" smtClean="0">
+              <a:rPr lang="en-GB" b="1" dirty="0">
                 <a:solidFill>
                   <a:schemeClr val="bg1"/>
                 </a:solidFill>
               </a:rPr>
               <a:t>Naïve Bayes</a:t>
             </a:r>
-            <a:endParaRPr lang="en-GB" b="1" dirty="0">
-              <a:solidFill>
-                <a:schemeClr val="bg1"/>
-              </a:solidFill>
-            </a:endParaRPr>
           </a:p>
         </p:txBody>
       </p:sp>
@@ -9348,10 +9151,9 @@
           <a:p>
             <a:pPr algn="ctr"/>
             <a:r>
-              <a:rPr lang="en-GB" sz="3200" b="1" dirty="0" smtClean="0"/>
+              <a:rPr lang="en-GB" sz="3200" b="1" dirty="0"/>
               <a:t>Train Logistic Regression</a:t>
             </a:r>
-            <a:endParaRPr lang="en-GB" sz="3200" b="1" dirty="0"/>
           </a:p>
         </p:txBody>
       </p:sp>
@@ -9378,10 +9180,9 @@
           <a:lstStyle/>
           <a:p>
             <a:r>
-              <a:rPr lang="en-GB" dirty="0" smtClean="0"/>
+              <a:rPr lang="en-GB" dirty="0"/>
               <a:t>Ensemble all predictions and train a Logistic Regression on top of them</a:t>
             </a:r>
-            <a:endParaRPr lang="en-GB" dirty="0"/>
           </a:p>
         </p:txBody>
       </p:sp>
@@ -9438,19 +9239,19 @@
           <a:lstStyle/>
           <a:p>
             <a:r>
-              <a:rPr lang="en-GB" sz="4800" dirty="0" smtClean="0"/>
+              <a:rPr lang="en-GB" sz="4800" dirty="0"/>
               <a:t>Results on the </a:t>
             </a:r>
             <a:r>
-              <a:rPr lang="en-GB" sz="4800" dirty="0" err="1" smtClean="0"/>
+              <a:rPr lang="en-GB" sz="4800" dirty="0" err="1"/>
               <a:t>Kaggle</a:t>
             </a:r>
             <a:r>
-              <a:rPr lang="en-GB" sz="4800" dirty="0" smtClean="0"/>
+              <a:rPr lang="en-GB" sz="4800" dirty="0"/>
               <a:t> </a:t>
             </a:r>
             <a:r>
-              <a:rPr lang="en-GB" sz="4800" dirty="0" err="1" smtClean="0"/>
+              <a:rPr lang="en-GB" sz="4800" dirty="0" err="1"/>
               <a:t>leaderboard</a:t>
             </a:r>
             <a:endParaRPr lang="en-GB" sz="4800" dirty="0"/>
@@ -9482,9 +9283,27 @@
                 <a:tableStyleId>{5C22544A-7EE6-4342-B048-85BDC9FD1C3A}</a:tableStyleId>
               </a:tblPr>
               <a:tblGrid>
-                <a:gridCol w="3124200"/>
-                <a:gridCol w="1905000"/>
-                <a:gridCol w="2514600"/>
+                <a:gridCol w="3124200">
+                  <a:extLst>
+                    <a:ext uri="{9D8B030D-6E8A-4147-A177-3AD203B41FA5}">
+                      <a16:colId xmlns:a16="http://schemas.microsoft.com/office/drawing/2014/main" val="20000"/>
+                    </a:ext>
+                  </a:extLst>
+                </a:gridCol>
+                <a:gridCol w="1905000">
+                  <a:extLst>
+                    <a:ext uri="{9D8B030D-6E8A-4147-A177-3AD203B41FA5}">
+                      <a16:colId xmlns:a16="http://schemas.microsoft.com/office/drawing/2014/main" val="20001"/>
+                    </a:ext>
+                  </a:extLst>
+                </a:gridCol>
+                <a:gridCol w="2514600">
+                  <a:extLst>
+                    <a:ext uri="{9D8B030D-6E8A-4147-A177-3AD203B41FA5}">
+                      <a16:colId xmlns:a16="http://schemas.microsoft.com/office/drawing/2014/main" val="20002"/>
+                    </a:ext>
+                  </a:extLst>
+                </a:gridCol>
               </a:tblGrid>
               <a:tr h="0">
                 <a:tc>
@@ -9568,13 +9387,7 @@
                         <a:rPr lang="en-GB" sz="2400">
                           <a:effectLst/>
                         </a:rPr>
-                        <a:t>the </a:t>
-                      </a:r>
-                      <a:r>
-                        <a:rPr lang="en-GB" sz="2400" smtClean="0">
-                          <a:effectLst/>
-                        </a:rPr>
-                        <a:t>leaderboard</a:t>
+                        <a:t>the leaderboard</a:t>
                       </a:r>
                       <a:endParaRPr lang="en-GB" sz="2000" dirty="0">
                         <a:effectLst/>
@@ -9586,6 +9399,11 @@
                   </a:txBody>
                   <a:tcPr marL="68580" marR="68580" marT="0" marB="0"/>
                 </a:tc>
+                <a:extLst>
+                  <a:ext uri="{0D108BD9-81ED-4DB2-BD59-A6C34878D82A}">
+                    <a16:rowId xmlns:a16="http://schemas.microsoft.com/office/drawing/2014/main" val="10000"/>
+                  </a:ext>
+                </a:extLst>
               </a:tr>
               <a:tr h="0">
                 <a:tc>
@@ -9605,13 +9423,7 @@
                         <a:rPr lang="en-GB" sz="1600" dirty="0">
                           <a:effectLst/>
                         </a:rPr>
-                        <a:t>Logistic Regression </a:t>
-                      </a:r>
-                      <a:r>
-                        <a:rPr lang="en-GB" sz="1600" dirty="0" smtClean="0">
-                          <a:effectLst/>
-                        </a:rPr>
-                        <a:t>Classifier</a:t>
+                        <a:t>Logistic Regression Classifier</a:t>
                       </a:r>
                     </a:p>
                     <a:p>
@@ -9691,6 +9503,11 @@
                   </a:txBody>
                   <a:tcPr marL="68580" marR="68580" marT="0" marB="0"/>
                 </a:tc>
+                <a:extLst>
+                  <a:ext uri="{0D108BD9-81ED-4DB2-BD59-A6C34878D82A}">
+                    <a16:rowId xmlns:a16="http://schemas.microsoft.com/office/drawing/2014/main" val="10001"/>
+                  </a:ext>
+                </a:extLst>
               </a:tr>
               <a:tr h="0">
                 <a:tc>
@@ -9712,9 +9529,6 @@
                         </a:rPr>
                         <a:t>Support Vector Classifier </a:t>
                       </a:r>
-                      <a:endParaRPr lang="en-GB" sz="1600" dirty="0" smtClean="0">
-                        <a:effectLst/>
-                      </a:endParaRPr>
                     </a:p>
                     <a:p>
                       <a:pPr algn="just">
@@ -9726,7 +9540,7 @@
                         </a:spcAft>
                       </a:pPr>
                       <a:r>
-                        <a:rPr lang="en-GB" sz="1600" dirty="0" smtClean="0">
+                        <a:rPr lang="en-GB" sz="1600" dirty="0">
                           <a:effectLst/>
                         </a:rPr>
                         <a:t>(</a:t>
@@ -9811,6 +9625,11 @@
                   </a:txBody>
                   <a:tcPr marL="68580" marR="68580" marT="0" marB="0"/>
                 </a:tc>
+                <a:extLst>
+                  <a:ext uri="{0D108BD9-81ED-4DB2-BD59-A6C34878D82A}">
+                    <a16:rowId xmlns:a16="http://schemas.microsoft.com/office/drawing/2014/main" val="10002"/>
+                  </a:ext>
+                </a:extLst>
               </a:tr>
               <a:tr h="0">
                 <a:tc>
@@ -9900,6 +9719,11 @@
                   </a:txBody>
                   <a:tcPr marL="68580" marR="68580" marT="0" marB="0"/>
                 </a:tc>
+                <a:extLst>
+                  <a:ext uri="{0D108BD9-81ED-4DB2-BD59-A6C34878D82A}">
+                    <a16:rowId xmlns:a16="http://schemas.microsoft.com/office/drawing/2014/main" val="10003"/>
+                  </a:ext>
+                </a:extLst>
               </a:tr>
               <a:tr h="324485">
                 <a:tc>
@@ -9989,6 +9813,11 @@
                   </a:txBody>
                   <a:tcPr marL="68580" marR="68580" marT="0" marB="0"/>
                 </a:tc>
+                <a:extLst>
+                  <a:ext uri="{0D108BD9-81ED-4DB2-BD59-A6C34878D82A}">
+                    <a16:rowId xmlns:a16="http://schemas.microsoft.com/office/drawing/2014/main" val="10004"/>
+                  </a:ext>
+                </a:extLst>
               </a:tr>
               <a:tr h="0">
                 <a:tc>
@@ -10078,6 +9907,11 @@
                   </a:txBody>
                   <a:tcPr marL="68580" marR="68580" marT="0" marB="0"/>
                 </a:tc>
+                <a:extLst>
+                  <a:ext uri="{0D108BD9-81ED-4DB2-BD59-A6C34878D82A}">
+                    <a16:rowId xmlns:a16="http://schemas.microsoft.com/office/drawing/2014/main" val="10005"/>
+                  </a:ext>
+                </a:extLst>
               </a:tr>
             </a:tbl>
           </a:graphicData>
@@ -10106,10 +9940,9 @@
           <a:lstStyle/>
           <a:p>
             <a:r>
-              <a:rPr lang="en-GB" dirty="0" smtClean="0"/>
+              <a:rPr lang="en-GB" dirty="0"/>
               <a:t>Support Vector Classifier performed better then the ensemble models</a:t>
             </a:r>
-            <a:endParaRPr lang="en-GB" dirty="0"/>
           </a:p>
         </p:txBody>
       </p:sp>
@@ -10166,10 +9999,9 @@
           <a:lstStyle/>
           <a:p>
             <a:r>
-              <a:rPr lang="en-GB" dirty="0" smtClean="0"/>
+              <a:rPr lang="en-GB" dirty="0"/>
               <a:t>Trying the prediction model on my photos</a:t>
             </a:r>
-            <a:endParaRPr lang="en-GB" dirty="0"/>
           </a:p>
         </p:txBody>
       </p:sp>
@@ -10249,7 +10081,7 @@
               <a:tabLst/>
             </a:pPr>
             <a:r>
-              <a:rPr kumimoji="0" lang="en-GB" altLang="en-US" sz="2000" b="0" i="0" u="none" strike="noStrike" cap="none" normalizeH="0" baseline="0" dirty="0" smtClean="0">
+              <a:rPr kumimoji="0" lang="en-GB" altLang="en-US" sz="2000" b="0" i="0" u="none" strike="noStrike" cap="none" normalizeH="0" baseline="0" dirty="0">
                 <a:ln>
                   <a:noFill/>
                 </a:ln>
@@ -10263,7 +10095,7 @@
               <a:t>Beers in a bar in New Orleans: </a:t>
             </a:r>
             <a:r>
-              <a:rPr kumimoji="0" lang="en-GB" altLang="en-US" sz="2000" b="1" i="0" u="none" strike="noStrike" cap="none" normalizeH="0" baseline="0" dirty="0" smtClean="0">
+              <a:rPr kumimoji="0" lang="en-GB" altLang="en-US" sz="2000" b="1" i="0" u="none" strike="noStrike" cap="none" normalizeH="0" baseline="0" dirty="0">
                 <a:ln>
                   <a:noFill/>
                 </a:ln>
@@ -10277,7 +10109,7 @@
               <a:t>good for lunch</a:t>
             </a:r>
             <a:r>
-              <a:rPr kumimoji="0" lang="en-GB" altLang="en-US" sz="2000" b="0" i="0" u="none" strike="noStrike" cap="none" normalizeH="0" baseline="0" dirty="0" smtClean="0">
+              <a:rPr kumimoji="0" lang="en-GB" altLang="en-US" sz="2000" b="0" i="0" u="none" strike="noStrike" cap="none" normalizeH="0" baseline="0" dirty="0">
                 <a:ln>
                   <a:noFill/>
                 </a:ln>
@@ -10291,7 +10123,7 @@
               <a:t>, </a:t>
             </a:r>
             <a:r>
-              <a:rPr kumimoji="0" lang="en-GB" altLang="en-US" sz="2000" b="1" i="0" u="none" strike="noStrike" cap="none" normalizeH="0" baseline="0" dirty="0" smtClean="0">
+              <a:rPr kumimoji="0" lang="en-GB" altLang="en-US" sz="2000" b="1" i="0" u="none" strike="noStrike" cap="none" normalizeH="0" baseline="0" dirty="0">
                 <a:ln>
                   <a:noFill/>
                 </a:ln>
@@ -10304,7 +10136,7 @@
               </a:rPr>
               <a:t>has alcohol</a:t>
             </a:r>
-            <a:endParaRPr kumimoji="0" lang="en-GB" altLang="en-US" sz="1200" b="1" i="0" u="none" strike="noStrike" cap="none" normalizeH="0" baseline="0" dirty="0" smtClean="0">
+            <a:endParaRPr kumimoji="0" lang="en-GB" altLang="en-US" sz="1200" b="1" i="0" u="none" strike="noStrike" cap="none" normalizeH="0" baseline="0" dirty="0">
               <a:ln>
                 <a:noFill/>
               </a:ln>
@@ -10331,7 +10163,7 @@
               <a:buNone/>
               <a:tabLst/>
             </a:pPr>
-            <a:endParaRPr kumimoji="0" lang="en-GB" altLang="en-US" sz="1800" b="0" i="0" u="none" strike="noStrike" cap="none" normalizeH="0" baseline="0" dirty="0" smtClean="0">
+            <a:endParaRPr kumimoji="0" lang="en-GB" altLang="en-US" sz="1800" b="0" i="0" u="none" strike="noStrike" cap="none" normalizeH="0" baseline="0" dirty="0">
               <a:ln>
                 <a:noFill/>
               </a:ln>
@@ -10501,10 +10333,9 @@
           <a:lstStyle/>
           <a:p>
             <a:r>
-              <a:rPr lang="en-GB" dirty="0" smtClean="0"/>
+              <a:rPr lang="en-GB" dirty="0"/>
               <a:t>Trying the prediction model on my photos</a:t>
             </a:r>
-            <a:endParaRPr lang="en-GB" dirty="0"/>
           </a:p>
         </p:txBody>
       </p:sp>
@@ -10589,7 +10420,7 @@
               </a:rPr>
               <a:t>good for lunch, good for kids</a:t>
             </a:r>
-            <a:endParaRPr kumimoji="0" lang="en-GB" altLang="en-US" sz="1800" b="1" i="0" u="none" strike="noStrike" cap="none" normalizeH="0" baseline="0" dirty="0" smtClean="0">
+            <a:endParaRPr kumimoji="0" lang="en-GB" altLang="en-US" sz="1800" b="1" i="0" u="none" strike="noStrike" cap="none" normalizeH="0" baseline="0" dirty="0">
               <a:ln>
                 <a:noFill/>
               </a:ln>
@@ -10748,10 +10579,9 @@
           <a:lstStyle/>
           <a:p>
             <a:r>
-              <a:rPr lang="en-GB" dirty="0" smtClean="0"/>
+              <a:rPr lang="en-GB" dirty="0"/>
               <a:t>Trying the prediction model on my photos</a:t>
             </a:r>
-            <a:endParaRPr lang="en-GB" dirty="0"/>
           </a:p>
         </p:txBody>
       </p:sp>
@@ -10823,23 +10653,12 @@
               </a:spcAft>
             </a:pPr>
             <a:r>
-              <a:rPr lang="en-GB" altLang="en-US" sz="2000" dirty="0" smtClean="0">
-                <a:ea typeface="Calibri" panose="020F0502020204030204" pitchFamily="34" charset="0"/>
-                <a:cs typeface="Times New Roman" panose="02020603050405020304" pitchFamily="18" charset="0"/>
-              </a:rPr>
-              <a:t>Fancy </a:t>
-            </a:r>
-            <a:r>
               <a:rPr lang="en-GB" altLang="en-US" sz="2000" dirty="0">
                 <a:ea typeface="Calibri" panose="020F0502020204030204" pitchFamily="34" charset="0"/>
                 <a:cs typeface="Times New Roman" panose="02020603050405020304" pitchFamily="18" charset="0"/>
               </a:rPr>
-              <a:t>dinner with a friend: </a:t>
-            </a:r>
-            <a:endParaRPr lang="en-GB" altLang="en-US" sz="2000" dirty="0" smtClean="0">
-              <a:ea typeface="Calibri" panose="020F0502020204030204" pitchFamily="34" charset="0"/>
-              <a:cs typeface="Times New Roman" panose="02020603050405020304" pitchFamily="18" charset="0"/>
-            </a:endParaRPr>
+              <a:t>Fancy dinner with a friend: </a:t>
+            </a:r>
           </a:p>
           <a:p>
             <a:pPr lvl="0" eaLnBrk="0" fontAlgn="base" hangingPunct="0">
@@ -10851,23 +10670,12 @@
               </a:spcAft>
             </a:pPr>
             <a:r>
-              <a:rPr lang="en-GB" altLang="en-US" sz="2000" b="1" dirty="0" smtClean="0">
-                <a:ea typeface="Calibri" panose="020F0502020204030204" pitchFamily="34" charset="0"/>
-                <a:cs typeface="Times New Roman" panose="02020603050405020304" pitchFamily="18" charset="0"/>
-              </a:rPr>
-              <a:t>good </a:t>
-            </a:r>
-            <a:r>
               <a:rPr lang="en-GB" altLang="en-US" sz="2000" b="1" dirty="0">
                 <a:ea typeface="Calibri" panose="020F0502020204030204" pitchFamily="34" charset="0"/>
                 <a:cs typeface="Times New Roman" panose="02020603050405020304" pitchFamily="18" charset="0"/>
               </a:rPr>
-              <a:t>for dinner, </a:t>
-            </a:r>
-            <a:endParaRPr lang="en-GB" altLang="en-US" sz="2000" b="1" dirty="0" smtClean="0">
-              <a:ea typeface="Calibri" panose="020F0502020204030204" pitchFamily="34" charset="0"/>
-              <a:cs typeface="Times New Roman" panose="02020603050405020304" pitchFamily="18" charset="0"/>
-            </a:endParaRPr>
+              <a:t>good for dinner, </a:t>
+            </a:r>
           </a:p>
           <a:p>
             <a:pPr lvl="0" eaLnBrk="0" fontAlgn="base" hangingPunct="0">
@@ -10879,23 +10687,12 @@
               </a:spcAft>
             </a:pPr>
             <a:r>
-              <a:rPr lang="en-GB" altLang="en-US" sz="2000" b="1" dirty="0" smtClean="0">
-                <a:ea typeface="Calibri" panose="020F0502020204030204" pitchFamily="34" charset="0"/>
-                <a:cs typeface="Times New Roman" panose="02020603050405020304" pitchFamily="18" charset="0"/>
-              </a:rPr>
-              <a:t>takes </a:t>
-            </a:r>
-            <a:r>
               <a:rPr lang="en-GB" altLang="en-US" sz="2000" b="1" dirty="0">
                 <a:ea typeface="Calibri" panose="020F0502020204030204" pitchFamily="34" charset="0"/>
                 <a:cs typeface="Times New Roman" panose="02020603050405020304" pitchFamily="18" charset="0"/>
               </a:rPr>
-              <a:t>reservations, </a:t>
-            </a:r>
-            <a:endParaRPr lang="en-GB" altLang="en-US" sz="2000" b="1" dirty="0" smtClean="0">
-              <a:ea typeface="Calibri" panose="020F0502020204030204" pitchFamily="34" charset="0"/>
-              <a:cs typeface="Times New Roman" panose="02020603050405020304" pitchFamily="18" charset="0"/>
-            </a:endParaRPr>
+              <a:t>takes reservations, </a:t>
+            </a:r>
           </a:p>
           <a:p>
             <a:pPr lvl="0" eaLnBrk="0" fontAlgn="base" hangingPunct="0">
@@ -10907,23 +10704,12 @@
               </a:spcAft>
             </a:pPr>
             <a:r>
-              <a:rPr lang="en-GB" altLang="en-US" sz="2000" b="1" dirty="0" smtClean="0">
-                <a:ea typeface="Calibri" panose="020F0502020204030204" pitchFamily="34" charset="0"/>
-                <a:cs typeface="Times New Roman" panose="02020603050405020304" pitchFamily="18" charset="0"/>
-              </a:rPr>
-              <a:t>restaurant </a:t>
-            </a:r>
-            <a:r>
               <a:rPr lang="en-GB" altLang="en-US" sz="2000" b="1" dirty="0">
                 <a:ea typeface="Calibri" panose="020F0502020204030204" pitchFamily="34" charset="0"/>
                 <a:cs typeface="Times New Roman" panose="02020603050405020304" pitchFamily="18" charset="0"/>
               </a:rPr>
-              <a:t>is expensive, </a:t>
-            </a:r>
-            <a:endParaRPr lang="en-GB" altLang="en-US" sz="2000" b="1" dirty="0" smtClean="0">
-              <a:ea typeface="Calibri" panose="020F0502020204030204" pitchFamily="34" charset="0"/>
-              <a:cs typeface="Times New Roman" panose="02020603050405020304" pitchFamily="18" charset="0"/>
-            </a:endParaRPr>
+              <a:t>restaurant is expensive, </a:t>
+            </a:r>
           </a:p>
           <a:p>
             <a:pPr lvl="0" eaLnBrk="0" fontAlgn="base" hangingPunct="0">
@@ -10935,23 +10721,12 @@
               </a:spcAft>
             </a:pPr>
             <a:r>
-              <a:rPr lang="en-GB" altLang="en-US" sz="2000" b="1" dirty="0" smtClean="0">
-                <a:ea typeface="Calibri" panose="020F0502020204030204" pitchFamily="34" charset="0"/>
-                <a:cs typeface="Times New Roman" panose="02020603050405020304" pitchFamily="18" charset="0"/>
-              </a:rPr>
-              <a:t>has </a:t>
-            </a:r>
-            <a:r>
               <a:rPr lang="en-GB" altLang="en-US" sz="2000" b="1" dirty="0">
                 <a:ea typeface="Calibri" panose="020F0502020204030204" pitchFamily="34" charset="0"/>
                 <a:cs typeface="Times New Roman" panose="02020603050405020304" pitchFamily="18" charset="0"/>
               </a:rPr>
-              <a:t>alcohol, </a:t>
-            </a:r>
-            <a:endParaRPr lang="en-GB" altLang="en-US" sz="2000" b="1" dirty="0" smtClean="0">
-              <a:ea typeface="Calibri" panose="020F0502020204030204" pitchFamily="34" charset="0"/>
-              <a:cs typeface="Times New Roman" panose="02020603050405020304" pitchFamily="18" charset="0"/>
-            </a:endParaRPr>
+              <a:t>has alcohol, </a:t>
+            </a:r>
           </a:p>
           <a:p>
             <a:pPr lvl="0" eaLnBrk="0" fontAlgn="base" hangingPunct="0">
@@ -10963,20 +10738,13 @@
               </a:spcAft>
             </a:pPr>
             <a:r>
-              <a:rPr lang="en-GB" altLang="en-US" sz="2000" b="1" dirty="0" smtClean="0">
-                <a:ea typeface="Calibri" panose="020F0502020204030204" pitchFamily="34" charset="0"/>
-                <a:cs typeface="Times New Roman" panose="02020603050405020304" pitchFamily="18" charset="0"/>
-              </a:rPr>
-              <a:t>has </a:t>
-            </a:r>
-            <a:r>
               <a:rPr lang="en-GB" altLang="en-US" sz="2000" b="1" dirty="0">
                 <a:ea typeface="Calibri" panose="020F0502020204030204" pitchFamily="34" charset="0"/>
                 <a:cs typeface="Times New Roman" panose="02020603050405020304" pitchFamily="18" charset="0"/>
               </a:rPr>
-              <a:t>table service</a:t>
-            </a:r>
-            <a:endParaRPr kumimoji="0" lang="en-GB" altLang="en-US" sz="1800" b="1" i="0" u="none" strike="noStrike" cap="none" normalizeH="0" baseline="0" dirty="0" smtClean="0">
+              <a:t>has table service</a:t>
+            </a:r>
+            <a:endParaRPr kumimoji="0" lang="en-GB" altLang="en-US" sz="1800" b="1" i="0" u="none" strike="noStrike" cap="none" normalizeH="0" baseline="0" dirty="0">
               <a:ln>
                 <a:noFill/>
               </a:ln>
@@ -11135,10 +10903,9 @@
           <a:lstStyle/>
           <a:p>
             <a:r>
-              <a:rPr lang="en-GB" dirty="0" smtClean="0"/>
+              <a:rPr lang="en-GB" dirty="0"/>
               <a:t>Trying the prediction model on my photos</a:t>
             </a:r>
-            <a:endParaRPr lang="en-GB" dirty="0"/>
           </a:p>
         </p:txBody>
       </p:sp>
@@ -11213,7 +10980,6 @@
               <a:rPr lang="en-GB" sz="2000" dirty="0"/>
               <a:t>Beer in a street café in Spain: </a:t>
             </a:r>
-            <a:endParaRPr lang="en-GB" sz="2000" dirty="0" smtClean="0"/>
           </a:p>
           <a:p>
             <a:pPr lvl="0" eaLnBrk="0" fontAlgn="base" hangingPunct="0">
@@ -11225,14 +10991,10 @@
               </a:spcAft>
             </a:pPr>
             <a:r>
-              <a:rPr lang="en-GB" sz="2000" b="1" dirty="0" smtClean="0"/>
-              <a:t>has </a:t>
-            </a:r>
-            <a:r>
               <a:rPr lang="en-GB" sz="2000" b="1" dirty="0"/>
-              <a:t>alcohol, has table services</a:t>
-            </a:r>
-            <a:endParaRPr kumimoji="0" lang="en-GB" altLang="en-US" sz="1800" b="1" i="0" u="none" strike="noStrike" cap="none" normalizeH="0" baseline="0" dirty="0" smtClean="0">
+              <a:t>has alcohol, has table services</a:t>
+            </a:r>
+            <a:endParaRPr kumimoji="0" lang="en-GB" altLang="en-US" sz="1800" b="1" i="0" u="none" strike="noStrike" cap="none" normalizeH="0" baseline="0" dirty="0">
               <a:ln>
                 <a:noFill/>
               </a:ln>
@@ -11387,10 +11149,9 @@
           <a:lstStyle/>
           <a:p>
             <a:r>
-              <a:rPr lang="en-GB" dirty="0" smtClean="0"/>
+              <a:rPr lang="en-GB" dirty="0"/>
               <a:t>Final remarks</a:t>
             </a:r>
-            <a:endParaRPr lang="en-GB" dirty="0"/>
           </a:p>
         </p:txBody>
       </p:sp>
@@ -11421,16 +11182,8 @@
               <a:buChar char="•"/>
             </a:pPr>
             <a:r>
-              <a:rPr lang="en-GB" dirty="0" smtClean="0"/>
-              <a:t>Classification </a:t>
-            </a:r>
-            <a:r>
               <a:rPr lang="en-GB" dirty="0"/>
-              <a:t>of images using the outcome just from one CNN model results in relatively good f-score (~</a:t>
-            </a:r>
-            <a:r>
-              <a:rPr lang="en-GB" dirty="0" smtClean="0"/>
-              <a:t>0.81)</a:t>
+              <a:t>Classification of images using the outcome just from one CNN model results in relatively good f-score (~0.81)</a:t>
             </a:r>
           </a:p>
           <a:p>
@@ -11446,14 +11199,9 @@
               <a:buChar char="•"/>
             </a:pPr>
             <a:r>
-              <a:rPr lang="en-GB" dirty="0" smtClean="0"/>
-              <a:t>Simple </a:t>
-            </a:r>
-            <a:r>
               <a:rPr lang="en-GB" dirty="0"/>
-              <a:t>model (SVC classifier) outperformed the ensemble models. </a:t>
-            </a:r>
-            <a:endParaRPr lang="en-GB" dirty="0" smtClean="0"/>
+              <a:t>Simple model (SVC classifier) outperformed the ensemble models. </a:t>
+            </a:r>
           </a:p>
           <a:p>
             <a:pPr marL="285750" indent="-285750">
@@ -11468,55 +11216,30 @@
               <a:buChar char="•"/>
             </a:pPr>
             <a:r>
-              <a:rPr lang="en-GB" dirty="0" smtClean="0"/>
+              <a:rPr lang="en-GB" dirty="0"/>
               <a:t>76</a:t>
             </a:r>
             <a:r>
-              <a:rPr lang="en-GB" baseline="30000" dirty="0" smtClean="0"/>
+              <a:rPr lang="en-GB" baseline="30000" dirty="0"/>
               <a:t>th</a:t>
             </a:r>
             <a:r>
-              <a:rPr lang="en-GB" dirty="0" smtClean="0"/>
+              <a:rPr lang="en-GB" dirty="0"/>
               <a:t> place on the </a:t>
             </a:r>
             <a:r>
-              <a:rPr lang="en-GB" dirty="0" err="1" smtClean="0"/>
+              <a:rPr lang="en-GB" dirty="0" err="1"/>
               <a:t>Kaggle</a:t>
             </a:r>
             <a:r>
-              <a:rPr lang="en-GB" dirty="0" smtClean="0"/>
+              <a:rPr lang="en-GB" dirty="0"/>
               <a:t> </a:t>
             </a:r>
             <a:r>
-              <a:rPr lang="en-GB" dirty="0" err="1" smtClean="0"/>
+              <a:rPr lang="en-GB" dirty="0" err="1"/>
               <a:t>leaderboard</a:t>
             </a:r>
-            <a:endParaRPr lang="en-GB" dirty="0" smtClean="0"/>
-          </a:p>
-          <a:p>
-            <a:pPr marL="285750" indent="-285750">
-              <a:buFont typeface="Arial" panose="020B0604020202020204" pitchFamily="34" charset="0"/>
-              <a:buChar char="•"/>
-            </a:pPr>
-            <a:endParaRPr lang="en-GB" dirty="0" smtClean="0"/>
-          </a:p>
-          <a:p>
-            <a:pPr marL="285750" indent="-285750">
-              <a:buFont typeface="Arial" panose="020B0604020202020204" pitchFamily="34" charset="0"/>
-              <a:buChar char="•"/>
-            </a:pPr>
-            <a:r>
-              <a:rPr lang="en-GB" dirty="0" smtClean="0"/>
-              <a:t>Further </a:t>
-            </a:r>
-            <a:r>
-              <a:rPr lang="en-GB" dirty="0"/>
-              <a:t>improvements in the model performance can be achieved by advanced feature </a:t>
-            </a:r>
-            <a:r>
-              <a:rPr lang="en-GB" dirty="0" smtClean="0"/>
-              <a:t>engineering</a:t>
-            </a:r>
+            <a:endParaRPr lang="en-GB" dirty="0"/>
           </a:p>
           <a:p>
             <a:pPr marL="285750" indent="-285750">
@@ -11531,10 +11254,26 @@
               <a:buChar char="•"/>
             </a:pPr>
             <a:r>
-              <a:rPr lang="en-GB" dirty="0" smtClean="0"/>
+              <a:rPr lang="en-GB" dirty="0"/>
+              <a:t>Further improvements in the model performance can be achieved by advanced feature engineering</a:t>
+            </a:r>
+          </a:p>
+          <a:p>
+            <a:pPr marL="285750" indent="-285750">
+              <a:buFont typeface="Arial" panose="020B0604020202020204" pitchFamily="34" charset="0"/>
+              <a:buChar char="•"/>
+            </a:pPr>
+            <a:endParaRPr lang="en-GB" dirty="0"/>
+          </a:p>
+          <a:p>
+            <a:pPr marL="285750" indent="-285750">
+              <a:buFont typeface="Arial" panose="020B0604020202020204" pitchFamily="34" charset="0"/>
+              <a:buChar char="•"/>
+            </a:pPr>
+            <a:r>
+              <a:rPr lang="en-GB" dirty="0"/>
               <a:t>The model gives sensible labels for my photos</a:t>
             </a:r>
-            <a:endParaRPr lang="en-GB" dirty="0"/>
           </a:p>
         </p:txBody>
       </p:sp>
@@ -11589,10 +11328,9 @@
           <a:lstStyle/>
           <a:p>
             <a:r>
-              <a:rPr lang="en-GB" dirty="0" smtClean="0"/>
+              <a:rPr lang="en-GB" dirty="0"/>
               <a:t>Review example</a:t>
             </a:r>
-            <a:endParaRPr lang="en-GB" dirty="0"/>
           </a:p>
         </p:txBody>
       </p:sp>
@@ -11731,10 +11469,9 @@
           <a:lstStyle/>
           <a:p>
             <a:r>
-              <a:rPr lang="en-GB" dirty="0" smtClean="0"/>
+              <a:rPr lang="en-GB" dirty="0"/>
               <a:t>Task overview</a:t>
             </a:r>
-            <a:endParaRPr lang="en-GB" dirty="0"/>
           </a:p>
         </p:txBody>
       </p:sp>
@@ -11761,67 +11498,39 @@
           <a:lstStyle/>
           <a:p>
             <a:r>
-              <a:rPr lang="en-GB" dirty="0" smtClean="0"/>
-              <a:t>Currently</a:t>
-            </a:r>
-            <a:r>
               <a:rPr lang="en-GB" dirty="0"/>
-              <a:t>, restaurant labels are manually selected by Yelp </a:t>
-            </a:r>
-            <a:r>
-              <a:rPr lang="en-GB" dirty="0" smtClean="0"/>
-              <a:t>users</a:t>
+              <a:t>Currently, restaurant labels are manually selected by Yelp users</a:t>
             </a:r>
           </a:p>
           <a:p>
             <a:r>
               <a:rPr lang="en-GB" dirty="0"/>
-              <a:t>But Yelp’s users upload an enormous amount of photos every day alongside their written </a:t>
-            </a:r>
-            <a:r>
-              <a:rPr lang="en-GB" dirty="0" smtClean="0"/>
-              <a:t>reviews</a:t>
+              <a:t>But Yelp’s users upload an enormous amount of photos every day alongside their written reviews</a:t>
             </a:r>
           </a:p>
           <a:p>
             <a:r>
               <a:rPr lang="en-GB" dirty="0"/>
-              <a:t>Selecting the labels is optional, leaving some restaurants un- or only partially-categorized</a:t>
-            </a:r>
-            <a:r>
-              <a:rPr lang="en-GB" dirty="0" smtClean="0"/>
-              <a:t>.</a:t>
+              <a:t>Selecting the labels is optional, leaving some restaurants un- or only partially-categorized.</a:t>
             </a:r>
           </a:p>
           <a:p>
             <a:pPr marL="0" indent="0">
               <a:buNone/>
             </a:pPr>
-            <a:endParaRPr lang="en-GB" dirty="0" smtClean="0"/>
+            <a:endParaRPr lang="en-GB" dirty="0"/>
           </a:p>
           <a:p>
             <a:pPr marL="0" indent="0">
               <a:buNone/>
             </a:pPr>
             <a:r>
-              <a:rPr lang="en-GB" sz="3200" b="1" u="sng" dirty="0" smtClean="0"/>
+              <a:rPr lang="en-GB" sz="3200" b="1" u="sng" dirty="0"/>
               <a:t>AIM</a:t>
             </a:r>
             <a:r>
-              <a:rPr lang="en-GB" sz="3200" b="1" dirty="0" smtClean="0"/>
-              <a:t>: build </a:t>
-            </a:r>
-            <a:r>
               <a:rPr lang="en-GB" sz="3200" b="1" dirty="0"/>
-              <a:t>a model that automatically tags restaurants with multiple labels using </a:t>
-            </a:r>
-            <a:r>
-              <a:rPr lang="en-GB" sz="3200" b="1" dirty="0" smtClean="0"/>
-              <a:t>user-submitted </a:t>
-            </a:r>
-            <a:r>
-              <a:rPr lang="en-GB" sz="3200" b="1" dirty="0"/>
-              <a:t>photos</a:t>
+              <a:t>: build a model that automatically tags restaurants with multiple labels using user-submitted photos</a:t>
             </a:r>
           </a:p>
         </p:txBody>
@@ -11907,10 +11616,9 @@
           <a:lstStyle/>
           <a:p>
             <a:r>
-              <a:rPr lang="en-GB" dirty="0" smtClean="0"/>
+              <a:rPr lang="en-GB" dirty="0"/>
               <a:t>Data set</a:t>
             </a:r>
-            <a:endParaRPr lang="en-GB" dirty="0"/>
           </a:p>
         </p:txBody>
       </p:sp>
@@ -11938,56 +11646,29 @@
           <a:p>
             <a:pPr lvl="0"/>
             <a:r>
-              <a:rPr lang="en-GB" dirty="0" smtClean="0"/>
-              <a:t>photos </a:t>
-            </a:r>
-            <a:r>
               <a:rPr lang="en-GB" dirty="0"/>
-              <a:t>of the training set (235841 images; 6.64 GB)</a:t>
+              <a:t>photos of the training set (235841 images; 6.64 GB)</a:t>
             </a:r>
           </a:p>
           <a:p>
             <a:pPr lvl="0"/>
             <a:r>
-              <a:rPr lang="en-GB" dirty="0" smtClean="0"/>
-              <a:t>photos </a:t>
-            </a:r>
-            <a:r>
               <a:rPr lang="en-GB" dirty="0"/>
-              <a:t>of the test set (474304 images; 6.71 GB)</a:t>
+              <a:t>photos of the test set (474304 images; 6.71 GB)</a:t>
             </a:r>
           </a:p>
           <a:p>
             <a:pPr lvl="0"/>
             <a:r>
-              <a:rPr lang="en-GB" dirty="0" smtClean="0"/>
-              <a:t>maps </a:t>
-            </a:r>
-            <a:r>
               <a:rPr lang="en-GB" dirty="0"/>
-              <a:t>the photo id to business id</a:t>
+              <a:t>a file that maps the photo id to business id</a:t>
             </a:r>
           </a:p>
           <a:p>
             <a:pPr lvl="0"/>
             <a:r>
-              <a:rPr lang="en-GB" dirty="0" smtClean="0"/>
-              <a:t>maps </a:t>
-            </a:r>
-            <a:r>
               <a:rPr lang="en-GB" dirty="0"/>
-              <a:t>the photo id to business id</a:t>
-            </a:r>
-          </a:p>
-          <a:p>
-            <a:pPr lvl="0"/>
-            <a:r>
-              <a:rPr lang="en-GB" dirty="0" smtClean="0"/>
-              <a:t>maps </a:t>
-            </a:r>
-            <a:r>
-              <a:rPr lang="en-GB" dirty="0"/>
-              <a:t>the business ids to their corresponding labels.</a:t>
+              <a:t>a file that maps the business ids to their corresponding labels.</a:t>
             </a:r>
           </a:p>
           <a:p>
@@ -12076,10 +11757,9 @@
           <a:lstStyle/>
           <a:p>
             <a:r>
-              <a:rPr lang="en-GB" dirty="0" smtClean="0"/>
+              <a:rPr lang="en-GB" dirty="0"/>
               <a:t>Restaurant labels</a:t>
             </a:r>
-            <a:endParaRPr lang="en-GB" dirty="0"/>
           </a:p>
         </p:txBody>
       </p:sp>
@@ -12109,8 +11789,20 @@
                 <a:tableStyleId>{5C22544A-7EE6-4342-B048-85BDC9FD1C3A}</a:tableStyleId>
               </a:tblPr>
               <a:tblGrid>
-                <a:gridCol w="1828800"/>
-                <a:gridCol w="5715000"/>
+                <a:gridCol w="1828800">
+                  <a:extLst>
+                    <a:ext uri="{9D8B030D-6E8A-4147-A177-3AD203B41FA5}">
+                      <a16:colId xmlns:a16="http://schemas.microsoft.com/office/drawing/2014/main" val="20000"/>
+                    </a:ext>
+                  </a:extLst>
+                </a:gridCol>
+                <a:gridCol w="5715000">
+                  <a:extLst>
+                    <a:ext uri="{9D8B030D-6E8A-4147-A177-3AD203B41FA5}">
+                      <a16:colId xmlns:a16="http://schemas.microsoft.com/office/drawing/2014/main" val="20001"/>
+                    </a:ext>
+                  </a:extLst>
+                </a:gridCol>
               </a:tblGrid>
               <a:tr h="0">
                 <a:tc>
@@ -12127,7 +11819,7 @@
                         </a:spcAft>
                       </a:pPr>
                       <a:r>
-                        <a:rPr lang="en-GB" sz="2400" dirty="0" smtClean="0">
+                        <a:rPr lang="en-GB" sz="2400" dirty="0">
                           <a:effectLst/>
                         </a:rPr>
                         <a:t>Label</a:t>
@@ -12171,6 +11863,11 @@
                   </a:txBody>
                   <a:tcPr marL="68580" marR="68580" marT="0" marB="0"/>
                 </a:tc>
+                <a:extLst>
+                  <a:ext uri="{0D108BD9-81ED-4DB2-BD59-A6C34878D82A}">
+                    <a16:rowId xmlns:a16="http://schemas.microsoft.com/office/drawing/2014/main" val="10000"/>
+                  </a:ext>
+                </a:extLst>
               </a:tr>
               <a:tr h="0">
                 <a:tc>
@@ -12231,6 +11928,11 @@
                   </a:txBody>
                   <a:tcPr marL="68580" marR="68580" marT="0" marB="0"/>
                 </a:tc>
+                <a:extLst>
+                  <a:ext uri="{0D108BD9-81ED-4DB2-BD59-A6C34878D82A}">
+                    <a16:rowId xmlns:a16="http://schemas.microsoft.com/office/drawing/2014/main" val="10001"/>
+                  </a:ext>
+                </a:extLst>
               </a:tr>
               <a:tr h="0">
                 <a:tc>
@@ -12291,6 +11993,11 @@
                   </a:txBody>
                   <a:tcPr marL="68580" marR="68580" marT="0" marB="0"/>
                 </a:tc>
+                <a:extLst>
+                  <a:ext uri="{0D108BD9-81ED-4DB2-BD59-A6C34878D82A}">
+                    <a16:rowId xmlns:a16="http://schemas.microsoft.com/office/drawing/2014/main" val="10002"/>
+                  </a:ext>
+                </a:extLst>
               </a:tr>
               <a:tr h="0">
                 <a:tc>
@@ -12351,6 +12058,11 @@
                   </a:txBody>
                   <a:tcPr marL="68580" marR="68580" marT="0" marB="0"/>
                 </a:tc>
+                <a:extLst>
+                  <a:ext uri="{0D108BD9-81ED-4DB2-BD59-A6C34878D82A}">
+                    <a16:rowId xmlns:a16="http://schemas.microsoft.com/office/drawing/2014/main" val="10003"/>
+                  </a:ext>
+                </a:extLst>
               </a:tr>
               <a:tr h="0">
                 <a:tc>
@@ -12411,6 +12123,11 @@
                   </a:txBody>
                   <a:tcPr marL="68580" marR="68580" marT="0" marB="0"/>
                 </a:tc>
+                <a:extLst>
+                  <a:ext uri="{0D108BD9-81ED-4DB2-BD59-A6C34878D82A}">
+                    <a16:rowId xmlns:a16="http://schemas.microsoft.com/office/drawing/2014/main" val="10004"/>
+                  </a:ext>
+                </a:extLst>
               </a:tr>
               <a:tr h="0">
                 <a:tc>
@@ -12471,6 +12188,11 @@
                   </a:txBody>
                   <a:tcPr marL="68580" marR="68580" marT="0" marB="0"/>
                 </a:tc>
+                <a:extLst>
+                  <a:ext uri="{0D108BD9-81ED-4DB2-BD59-A6C34878D82A}">
+                    <a16:rowId xmlns:a16="http://schemas.microsoft.com/office/drawing/2014/main" val="10005"/>
+                  </a:ext>
+                </a:extLst>
               </a:tr>
               <a:tr h="0">
                 <a:tc>
@@ -12531,6 +12253,11 @@
                   </a:txBody>
                   <a:tcPr marL="68580" marR="68580" marT="0" marB="0"/>
                 </a:tc>
+                <a:extLst>
+                  <a:ext uri="{0D108BD9-81ED-4DB2-BD59-A6C34878D82A}">
+                    <a16:rowId xmlns:a16="http://schemas.microsoft.com/office/drawing/2014/main" val="10006"/>
+                  </a:ext>
+                </a:extLst>
               </a:tr>
               <a:tr h="0">
                 <a:tc>
@@ -12591,6 +12318,11 @@
                   </a:txBody>
                   <a:tcPr marL="68580" marR="68580" marT="0" marB="0"/>
                 </a:tc>
+                <a:extLst>
+                  <a:ext uri="{0D108BD9-81ED-4DB2-BD59-A6C34878D82A}">
+                    <a16:rowId xmlns:a16="http://schemas.microsoft.com/office/drawing/2014/main" val="10007"/>
+                  </a:ext>
+                </a:extLst>
               </a:tr>
               <a:tr h="0">
                 <a:tc>
@@ -12651,6 +12383,11 @@
                   </a:txBody>
                   <a:tcPr marL="68580" marR="68580" marT="0" marB="0"/>
                 </a:tc>
+                <a:extLst>
+                  <a:ext uri="{0D108BD9-81ED-4DB2-BD59-A6C34878D82A}">
+                    <a16:rowId xmlns:a16="http://schemas.microsoft.com/office/drawing/2014/main" val="10008"/>
+                  </a:ext>
+                </a:extLst>
               </a:tr>
               <a:tr h="0">
                 <a:tc>
@@ -12711,6 +12448,11 @@
                   </a:txBody>
                   <a:tcPr marL="68580" marR="68580" marT="0" marB="0"/>
                 </a:tc>
+                <a:extLst>
+                  <a:ext uri="{0D108BD9-81ED-4DB2-BD59-A6C34878D82A}">
+                    <a16:rowId xmlns:a16="http://schemas.microsoft.com/office/drawing/2014/main" val="10009"/>
+                  </a:ext>
+                </a:extLst>
               </a:tr>
             </a:tbl>
           </a:graphicData>
@@ -12797,10 +12539,9 @@
           <a:lstStyle/>
           <a:p>
             <a:r>
-              <a:rPr lang="en-GB" dirty="0" smtClean="0"/>
+              <a:rPr lang="en-GB" dirty="0"/>
               <a:t>An example</a:t>
             </a:r>
-            <a:endParaRPr lang="en-GB" dirty="0"/>
           </a:p>
         </p:txBody>
       </p:sp>
@@ -12917,7 +12658,7 @@
               <a:t>g</a:t>
             </a:r>
             <a:r>
-              <a:rPr kumimoji="0" lang="en-GB" altLang="en-US" sz="2400" b="0" i="0" u="none" strike="noStrike" cap="none" normalizeH="0" baseline="0" dirty="0" smtClean="0">
+              <a:rPr kumimoji="0" lang="en-GB" altLang="en-US" sz="2400" b="0" i="0" u="none" strike="noStrike" cap="none" normalizeH="0" baseline="0" dirty="0">
                 <a:ln>
                   <a:noFill/>
                 </a:ln>
@@ -12949,7 +12690,7 @@
               <a:tabLst/>
             </a:pPr>
             <a:r>
-              <a:rPr kumimoji="0" lang="en-GB" altLang="en-US" sz="2400" b="0" i="0" u="none" strike="noStrike" cap="none" normalizeH="0" baseline="0" dirty="0" smtClean="0">
+              <a:rPr kumimoji="0" lang="en-GB" altLang="en-US" sz="2400" b="0" i="0" u="none" strike="noStrike" cap="none" normalizeH="0" baseline="0" dirty="0">
                 <a:ln>
                   <a:noFill/>
                 </a:ln>
@@ -12981,7 +12722,7 @@
               <a:tabLst/>
             </a:pPr>
             <a:r>
-              <a:rPr kumimoji="0" lang="en-GB" altLang="en-US" sz="2400" b="0" i="0" u="none" strike="noStrike" cap="none" normalizeH="0" baseline="0" dirty="0" smtClean="0">
+              <a:rPr kumimoji="0" lang="en-GB" altLang="en-US" sz="2400" b="0" i="0" u="none" strike="noStrike" cap="none" normalizeH="0" baseline="0" dirty="0">
                 <a:ln>
                   <a:noFill/>
                 </a:ln>
@@ -13013,7 +12754,7 @@
               <a:tabLst/>
             </a:pPr>
             <a:r>
-              <a:rPr kumimoji="0" lang="en-GB" altLang="en-US" sz="2400" b="0" i="0" u="none" strike="noStrike" cap="none" normalizeH="0" baseline="0" dirty="0" smtClean="0">
+              <a:rPr kumimoji="0" lang="en-GB" altLang="en-US" sz="2400" b="0" i="0" u="none" strike="noStrike" cap="none" normalizeH="0" baseline="0" dirty="0">
                 <a:ln>
                   <a:noFill/>
                 </a:ln>
@@ -13045,7 +12786,7 @@
               <a:tabLst/>
             </a:pPr>
             <a:r>
-              <a:rPr kumimoji="0" lang="en-GB" altLang="en-US" sz="2400" b="0" i="0" u="none" strike="noStrike" cap="none" normalizeH="0" baseline="0" dirty="0" smtClean="0">
+              <a:rPr kumimoji="0" lang="en-GB" altLang="en-US" sz="2400" b="0" i="0" u="none" strike="noStrike" cap="none" normalizeH="0" baseline="0" dirty="0">
                 <a:ln>
                   <a:noFill/>
                 </a:ln>
@@ -13058,7 +12799,7 @@
               </a:rPr>
               <a:t>ambience is classy</a:t>
             </a:r>
-            <a:endParaRPr kumimoji="0" lang="en-GB" altLang="en-US" sz="2400" b="0" i="0" u="none" strike="noStrike" cap="none" normalizeH="0" baseline="0" dirty="0" smtClean="0">
+            <a:endParaRPr kumimoji="0" lang="en-GB" altLang="en-US" sz="2400" b="0" i="0" u="none" strike="noStrike" cap="none" normalizeH="0" baseline="0" dirty="0">
               <a:ln>
                 <a:noFill/>
               </a:ln>
@@ -13085,7 +12826,7 @@
               <a:buChar char="•"/>
               <a:tabLst/>
             </a:pPr>
-            <a:endParaRPr kumimoji="0" lang="en-GB" altLang="en-US" sz="1800" b="0" i="0" u="none" strike="noStrike" cap="none" normalizeH="0" baseline="0" dirty="0" smtClean="0">
+            <a:endParaRPr kumimoji="0" lang="en-GB" altLang="en-US" sz="1800" b="0" i="0" u="none" strike="noStrike" cap="none" normalizeH="0" baseline="0" dirty="0">
               <a:ln>
                 <a:noFill/>
               </a:ln>
@@ -13222,10 +12963,9 @@
           <a:lstStyle/>
           <a:p>
             <a:r>
-              <a:rPr lang="en-GB" dirty="0" smtClean="0"/>
+              <a:rPr lang="en-GB" dirty="0"/>
               <a:t>What kind of problem is it in Machine Learning?</a:t>
             </a:r>
-            <a:endParaRPr lang="en-GB" dirty="0"/>
           </a:p>
         </p:txBody>
       </p:sp>
@@ -13714,13 +13454,13 @@
           <a:lstStyle/>
           <a:p>
             <a:r>
-              <a:rPr lang="en-GB" dirty="0" smtClean="0"/>
+              <a:rPr lang="en-GB" dirty="0"/>
               <a:t>1</a:t>
             </a:r>
           </a:p>
           <a:p>
             <a:r>
-              <a:rPr lang="en-GB" dirty="0" smtClean="0"/>
+              <a:rPr lang="en-GB" dirty="0"/>
               <a:t>2</a:t>
             </a:r>
           </a:p>
@@ -13801,13 +13541,13 @@
           <a:lstStyle/>
           <a:p>
             <a:r>
-              <a:rPr lang="en-GB" dirty="0" smtClean="0"/>
+              <a:rPr lang="en-GB" dirty="0"/>
               <a:t>0</a:t>
             </a:r>
           </a:p>
           <a:p>
             <a:r>
-              <a:rPr lang="en-GB" dirty="0" smtClean="0"/>
+              <a:rPr lang="en-GB" dirty="0"/>
               <a:t>2</a:t>
             </a:r>
           </a:p>
@@ -13816,11 +13556,10 @@
               <a:rPr lang="en-GB" dirty="0"/>
               <a:t>4</a:t>
             </a:r>
-            <a:endParaRPr lang="en-GB" dirty="0" smtClean="0"/>
-          </a:p>
-          <a:p>
-            <a:r>
-              <a:rPr lang="en-GB" dirty="0" smtClean="0"/>
+          </a:p>
+          <a:p>
+            <a:r>
+              <a:rPr lang="en-GB" dirty="0"/>
               <a:t>8</a:t>
             </a:r>
           </a:p>
@@ -13895,7 +13634,7 @@
           <a:lstStyle/>
           <a:p>
             <a:r>
-              <a:rPr lang="en-GB" dirty="0" smtClean="0"/>
+              <a:rPr lang="en-GB" dirty="0"/>
               <a:t>2</a:t>
             </a:r>
           </a:p>
@@ -14261,10 +14000,9 @@
           <a:p>
             <a:pPr algn="ctr"/>
             <a:r>
-              <a:rPr lang="en-GB" sz="2400" b="1" dirty="0" smtClean="0"/>
+              <a:rPr lang="en-GB" sz="2400" b="1" dirty="0"/>
               <a:t>Labels</a:t>
             </a:r>
-            <a:endParaRPr lang="en-GB" sz="2400" b="1" dirty="0"/>
           </a:p>
         </p:txBody>
       </p:sp>
@@ -14292,10 +14030,9 @@
           <a:p>
             <a:pPr algn="ctr"/>
             <a:r>
-              <a:rPr lang="en-GB" sz="2400" b="1" dirty="0" smtClean="0"/>
+              <a:rPr lang="en-GB" sz="2400" b="1" dirty="0"/>
               <a:t>Business ids</a:t>
             </a:r>
-            <a:endParaRPr lang="en-GB" sz="2400" b="1" dirty="0"/>
           </a:p>
         </p:txBody>
       </p:sp>
@@ -14323,10 +14060,9 @@
           <a:p>
             <a:pPr algn="ctr"/>
             <a:r>
-              <a:rPr lang="en-GB" sz="2400" b="1" dirty="0" smtClean="0"/>
+              <a:rPr lang="en-GB" sz="2400" b="1" dirty="0"/>
               <a:t>Photos</a:t>
             </a:r>
-            <a:endParaRPr lang="en-GB" sz="2400" b="1" dirty="0"/>
           </a:p>
         </p:txBody>
       </p:sp>
@@ -14354,10 +14090,9 @@
           <a:p>
             <a:pPr algn="ctr"/>
             <a:r>
-              <a:rPr lang="en-GB" dirty="0" smtClean="0"/>
+              <a:rPr lang="en-GB" dirty="0"/>
               <a:t>Business 1</a:t>
             </a:r>
-            <a:endParaRPr lang="en-GB" dirty="0"/>
           </a:p>
         </p:txBody>
       </p:sp>
@@ -14385,10 +14120,9 @@
           <a:p>
             <a:pPr algn="ctr"/>
             <a:r>
-              <a:rPr lang="en-GB" dirty="0" smtClean="0"/>
+              <a:rPr lang="en-GB" dirty="0"/>
               <a:t>Business 2</a:t>
             </a:r>
-            <a:endParaRPr lang="en-GB" dirty="0"/>
           </a:p>
         </p:txBody>
       </p:sp>
@@ -14416,10 +14150,9 @@
           <a:p>
             <a:pPr algn="ctr"/>
             <a:r>
-              <a:rPr lang="en-GB" dirty="0" smtClean="0"/>
+              <a:rPr lang="en-GB" dirty="0"/>
               <a:t>Business 3</a:t>
             </a:r>
-            <a:endParaRPr lang="en-GB" dirty="0"/>
           </a:p>
         </p:txBody>
       </p:sp>
@@ -14776,10 +14509,9 @@
           <a:lstStyle/>
           <a:p>
             <a:r>
-              <a:rPr lang="en-GB" dirty="0" smtClean="0"/>
+              <a:rPr lang="en-GB" dirty="0"/>
               <a:t>What kind of problem is it in Machine Learning?</a:t>
             </a:r>
-            <a:endParaRPr lang="en-GB" dirty="0"/>
           </a:p>
         </p:txBody>
       </p:sp>
@@ -15268,13 +15000,13 @@
           <a:lstStyle/>
           <a:p>
             <a:r>
-              <a:rPr lang="en-GB" dirty="0" smtClean="0"/>
+              <a:rPr lang="en-GB" dirty="0"/>
               <a:t>1</a:t>
             </a:r>
           </a:p>
           <a:p>
             <a:r>
-              <a:rPr lang="en-GB" dirty="0" smtClean="0"/>
+              <a:rPr lang="en-GB" dirty="0"/>
               <a:t>2</a:t>
             </a:r>
           </a:p>
@@ -15355,13 +15087,13 @@
           <a:lstStyle/>
           <a:p>
             <a:r>
-              <a:rPr lang="en-GB" dirty="0" smtClean="0"/>
+              <a:rPr lang="en-GB" dirty="0"/>
               <a:t>0</a:t>
             </a:r>
           </a:p>
           <a:p>
             <a:r>
-              <a:rPr lang="en-GB" dirty="0" smtClean="0"/>
+              <a:rPr lang="en-GB" dirty="0"/>
               <a:t>2</a:t>
             </a:r>
           </a:p>
@@ -15370,11 +15102,10 @@
               <a:rPr lang="en-GB" dirty="0"/>
               <a:t>4</a:t>
             </a:r>
-            <a:endParaRPr lang="en-GB" dirty="0" smtClean="0"/>
-          </a:p>
-          <a:p>
-            <a:r>
-              <a:rPr lang="en-GB" dirty="0" smtClean="0"/>
+          </a:p>
+          <a:p>
+            <a:r>
+              <a:rPr lang="en-GB" dirty="0"/>
               <a:t>8</a:t>
             </a:r>
           </a:p>
@@ -15449,7 +15180,7 @@
           <a:lstStyle/>
           <a:p>
             <a:r>
-              <a:rPr lang="en-GB" dirty="0" smtClean="0"/>
+              <a:rPr lang="en-GB" dirty="0"/>
               <a:t>2</a:t>
             </a:r>
           </a:p>
@@ -15815,10 +15546,9 @@
           <a:p>
             <a:pPr algn="ctr"/>
             <a:r>
-              <a:rPr lang="en-GB" sz="2400" b="1" dirty="0" smtClean="0"/>
+              <a:rPr lang="en-GB" sz="2400" b="1" dirty="0"/>
               <a:t>Labels</a:t>
             </a:r>
-            <a:endParaRPr lang="en-GB" sz="2400" b="1" dirty="0"/>
           </a:p>
         </p:txBody>
       </p:sp>
@@ -15846,10 +15576,9 @@
           <a:p>
             <a:pPr algn="ctr"/>
             <a:r>
-              <a:rPr lang="en-GB" sz="2400" b="1" dirty="0" smtClean="0"/>
+              <a:rPr lang="en-GB" sz="2400" b="1" dirty="0"/>
               <a:t>Business ids</a:t>
             </a:r>
-            <a:endParaRPr lang="en-GB" sz="2400" b="1" dirty="0"/>
           </a:p>
         </p:txBody>
       </p:sp>
@@ -15877,10 +15606,9 @@
           <a:p>
             <a:pPr algn="ctr"/>
             <a:r>
-              <a:rPr lang="en-GB" sz="2400" b="1" dirty="0" smtClean="0"/>
+              <a:rPr lang="en-GB" sz="2400" b="1" dirty="0"/>
               <a:t>Photos</a:t>
             </a:r>
-            <a:endParaRPr lang="en-GB" sz="2400" b="1" dirty="0"/>
           </a:p>
         </p:txBody>
       </p:sp>
@@ -15908,10 +15636,9 @@
           <a:p>
             <a:pPr algn="ctr"/>
             <a:r>
-              <a:rPr lang="en-GB" dirty="0" smtClean="0"/>
+              <a:rPr lang="en-GB" dirty="0"/>
               <a:t>Business 1</a:t>
             </a:r>
-            <a:endParaRPr lang="en-GB" dirty="0"/>
           </a:p>
         </p:txBody>
       </p:sp>
@@ -15939,10 +15666,9 @@
           <a:p>
             <a:pPr algn="ctr"/>
             <a:r>
-              <a:rPr lang="en-GB" dirty="0" smtClean="0"/>
+              <a:rPr lang="en-GB" dirty="0"/>
               <a:t>Business 2</a:t>
             </a:r>
-            <a:endParaRPr lang="en-GB" dirty="0"/>
           </a:p>
         </p:txBody>
       </p:sp>
@@ -15970,10 +15696,9 @@
           <a:p>
             <a:pPr algn="ctr"/>
             <a:r>
-              <a:rPr lang="en-GB" dirty="0" smtClean="0"/>
+              <a:rPr lang="en-GB" dirty="0"/>
               <a:t>Business 3</a:t>
             </a:r>
-            <a:endParaRPr lang="en-GB" dirty="0"/>
           </a:p>
         </p:txBody>
       </p:sp>
@@ -16312,10 +16037,9 @@
           <a:p>
             <a:pPr algn="ctr"/>
             <a:r>
-              <a:rPr lang="en-GB" sz="2400" b="1" dirty="0" smtClean="0"/>
+              <a:rPr lang="en-GB" sz="2400" b="1" dirty="0"/>
               <a:t>Multi-class aspect</a:t>
             </a:r>
-            <a:endParaRPr lang="en-GB" sz="2400" b="1" dirty="0"/>
           </a:p>
         </p:txBody>
       </p:sp>
@@ -16384,10 +16108,9 @@
           <a:p>
             <a:pPr algn="ctr"/>
             <a:r>
-              <a:rPr lang="en-GB" sz="2400" b="1" dirty="0" smtClean="0"/>
+              <a:rPr lang="en-GB" sz="2400" b="1" dirty="0"/>
               <a:t>Multi-instance aspect</a:t>
             </a:r>
-            <a:endParaRPr lang="en-GB" sz="2400" b="1" dirty="0"/>
           </a:p>
         </p:txBody>
       </p:sp>

</xml_diff>